<commit_message>
Add validation and fix genre
</commit_message>
<xml_diff>
--- a/MongoDBChanges.pptx
+++ b/MongoDBChanges.pptx
@@ -5,7 +5,7 @@
     <p:sldMasterId id="2147483648" r:id="rId1"/>
   </p:sldMasterIdLst>
   <p:notesMasterIdLst>
-    <p:notesMasterId r:id="rId29"/>
+    <p:notesMasterId r:id="rId33"/>
   </p:notesMasterIdLst>
   <p:sldIdLst>
     <p:sldId id="256" r:id="rId2"/>
@@ -18,7 +18,7 @@
     <p:sldId id="291" r:id="rId9"/>
     <p:sldId id="258" r:id="rId10"/>
     <p:sldId id="259" r:id="rId11"/>
-    <p:sldId id="260" r:id="rId12"/>
+    <p:sldId id="302" r:id="rId12"/>
     <p:sldId id="263" r:id="rId13"/>
     <p:sldId id="264" r:id="rId14"/>
     <p:sldId id="265" r:id="rId15"/>
@@ -35,6 +35,10 @@
     <p:sldId id="281" r:id="rId26"/>
     <p:sldId id="293" r:id="rId27"/>
     <p:sldId id="301" r:id="rId28"/>
+    <p:sldId id="304" r:id="rId29"/>
+    <p:sldId id="306" r:id="rId30"/>
+    <p:sldId id="305" r:id="rId31"/>
+    <p:sldId id="303" r:id="rId32"/>
   </p:sldIdLst>
   <p:sldSz cx="9144000" cy="6858000" type="screen4x3"/>
   <p:notesSz cx="6858000" cy="9144000"/>
@@ -234,7 +238,7 @@
           <a:p>
             <a:fld id="{0A0AACEF-20EC-449C-A177-7D7762A9081E}" type="datetimeFigureOut">
               <a:rPr lang="en-US" smtClean="0"/>
-              <a:t>6/3/2017</a:t>
+              <a:t>6/15/2017</a:t>
             </a:fld>
             <a:endParaRPr lang="en-US"/>
           </a:p>
@@ -895,11 +899,41 @@
           <a:p>
             <a:r>
               <a:rPr lang="en-US" dirty="0" smtClean="0"/>
-              <a:t>Explain these, and then insert</a:t>
+              <a:t>Explain that mongo locally will have a server running and we communicate with the server using a shell.</a:t>
             </a:r>
             <a:r>
               <a:rPr lang="en-US" baseline="0" dirty="0" smtClean="0"/>
-              <a:t> our first movie.  Start with:</a:t>
+              <a:t>  To see that everything is ok, open the shell and get the version.</a:t>
+            </a:r>
+            <a:endParaRPr lang="en-US" dirty="0" smtClean="0"/>
+          </a:p>
+          <a:p>
+            <a:endParaRPr lang="en-US" dirty="0" smtClean="0"/>
+          </a:p>
+          <a:p>
+            <a:r>
+              <a:rPr lang="en-US" dirty="0" smtClean="0"/>
+              <a:t>This belong</a:t>
+            </a:r>
+            <a:r>
+              <a:rPr lang="en-US" baseline="0" dirty="0" smtClean="0"/>
+              <a:t> in </a:t>
+            </a:r>
+            <a:r>
+              <a:rPr lang="en-US" baseline="0" dirty="0" err="1" smtClean="0"/>
+              <a:t>github</a:t>
+            </a:r>
+            <a:r>
+              <a:rPr lang="en-US" baseline="0" dirty="0" smtClean="0"/>
+              <a:t> or wiki.  Maybe have slides with info – let them get them get off </a:t>
+            </a:r>
+            <a:r>
+              <a:rPr lang="en-US" baseline="0" dirty="0" err="1" smtClean="0"/>
+              <a:t>dropbox</a:t>
+            </a:r>
+            <a:r>
+              <a:rPr lang="en-US" baseline="0" dirty="0" smtClean="0"/>
+              <a:t> or email in advance since may know who signed up?</a:t>
             </a:r>
           </a:p>
           <a:p>
@@ -907,12 +941,8 @@
           </a:p>
           <a:p>
             <a:r>
-              <a:rPr lang="en-US" baseline="0" dirty="0" err="1" smtClean="0"/>
-              <a:t>Db.movies.save</a:t>
-            </a:r>
-            <a:r>
               <a:rPr lang="en-US" baseline="0" dirty="0" smtClean="0"/>
-              <a:t>({title: “The Incredibles”, plot: “A family of undercover superheroes are forced into action to save the world.”})</a:t>
+              <a:t>Explain this slide and stop to make sure people are ready before you start demonstrating things…</a:t>
             </a:r>
           </a:p>
           <a:p>
@@ -921,68 +951,7 @@
           <a:p>
             <a:r>
               <a:rPr lang="en-US" baseline="0" dirty="0" smtClean="0"/>
-              <a:t>- The shell responds what changed in the collection</a:t>
-            </a:r>
-          </a:p>
-          <a:p>
-            <a:pPr marL="171450" indent="-171450">
-              <a:buFontTx/>
-              <a:buChar char="-"/>
-            </a:pPr>
-            <a:r>
-              <a:rPr lang="en-US" baseline="0" dirty="0" smtClean="0"/>
-              <a:t>_id is assigned if we don’t supply it – again a </a:t>
-            </a:r>
-            <a:r>
-              <a:rPr lang="en-US" baseline="0" dirty="0" err="1" smtClean="0"/>
-              <a:t>guid</a:t>
-            </a:r>
-            <a:r>
-              <a:rPr lang="en-US" baseline="0" dirty="0" smtClean="0"/>
-              <a:t> that contains a timestamp – can be used for audio info</a:t>
-            </a:r>
-          </a:p>
-          <a:p>
-            <a:pPr marL="0" indent="0">
-              <a:buFontTx/>
-              <a:buNone/>
-            </a:pPr>
-            <a:r>
-              <a:rPr lang="en-US" baseline="0" dirty="0" smtClean="0"/>
-              <a:t>- </a:t>
-            </a:r>
-            <a:r>
-              <a:rPr lang="en-US" dirty="0" smtClean="0"/>
-              <a:t>the shell is a </a:t>
-            </a:r>
-            <a:r>
-              <a:rPr lang="en-US" dirty="0" err="1" smtClean="0"/>
-              <a:t>javascript</a:t>
-            </a:r>
-            <a:r>
-              <a:rPr lang="en-US" dirty="0" smtClean="0"/>
-              <a:t> interpreter.  So it might respond</a:t>
-            </a:r>
-            <a:r>
-              <a:rPr lang="en-US" baseline="0" dirty="0" smtClean="0"/>
-              <a:t> to you with unexpected things </a:t>
-            </a:r>
-            <a:r>
-              <a:rPr lang="en-US" dirty="0" smtClean="0"/>
-              <a:t>like you would</a:t>
-            </a:r>
-            <a:r>
-              <a:rPr lang="en-US" baseline="0" dirty="0" smtClean="0"/>
-              <a:t> see in a browser console.</a:t>
-            </a:r>
-          </a:p>
-          <a:p>
-            <a:endParaRPr lang="en-US" baseline="0" dirty="0" smtClean="0"/>
-          </a:p>
-          <a:p>
-            <a:r>
-              <a:rPr lang="en-US" baseline="0" dirty="0" smtClean="0"/>
-              <a:t>Have everyone import data</a:t>
+              <a:t>Go back and forth between slide and demo, finally do some exercises.</a:t>
             </a:r>
           </a:p>
           <a:p>
@@ -1019,7 +988,7 @@
     </p:spTree>
     <p:extLst>
       <p:ext uri="{BB962C8B-B14F-4D97-AF65-F5344CB8AC3E}">
-        <p14:creationId xmlns:p14="http://schemas.microsoft.com/office/powerpoint/2010/main" val="2125433893"/>
+        <p14:creationId xmlns:p14="http://schemas.microsoft.com/office/powerpoint/2010/main" val="3883698302"/>
       </p:ext>
     </p:extLst>
   </p:cSld>
@@ -2249,6 +2218,94 @@
           <a:bodyPr/>
           <a:lstStyle/>
           <a:p>
+            <a:r>
+              <a:rPr lang="en-US" dirty="0" err="1" smtClean="0"/>
+              <a:t>db.movies.update</a:t>
+            </a:r>
+            <a:r>
+              <a:rPr lang="en-US" dirty="0" smtClean="0"/>
+              <a:t>({</a:t>
+            </a:r>
+            <a:r>
+              <a:rPr lang="en-US" dirty="0" err="1" smtClean="0"/>
+              <a:t>title:"Batman</a:t>
+            </a:r>
+            <a:r>
+              <a:rPr lang="en-US" dirty="0" smtClean="0"/>
+              <a:t>"},{$set: {</a:t>
+            </a:r>
+            <a:r>
+              <a:rPr lang="en-US" dirty="0" err="1" smtClean="0"/>
+              <a:t>boxOffice</a:t>
+            </a:r>
+            <a:r>
+              <a:rPr lang="en-US" dirty="0" smtClean="0"/>
+              <a:t>: 12331}})</a:t>
+            </a:r>
+          </a:p>
+          <a:p>
+            <a:endParaRPr lang="en-US" dirty="0" smtClean="0"/>
+          </a:p>
+          <a:p>
+            <a:r>
+              <a:rPr lang="en-US" dirty="0" err="1" smtClean="0"/>
+              <a:t>db.movies.update</a:t>
+            </a:r>
+            <a:r>
+              <a:rPr lang="en-US" dirty="0" smtClean="0"/>
+              <a:t>({</a:t>
+            </a:r>
+            <a:r>
+              <a:rPr lang="en-US" dirty="0" err="1" smtClean="0"/>
+              <a:t>title:"Batman</a:t>
+            </a:r>
+            <a:r>
+              <a:rPr lang="en-US" dirty="0" smtClean="0"/>
+              <a:t>"},{$push: {actors: "Jack </a:t>
+            </a:r>
+            <a:r>
+              <a:rPr lang="en-US" dirty="0" err="1" smtClean="0"/>
+              <a:t>Palance</a:t>
+            </a:r>
+            <a:r>
+              <a:rPr lang="en-US" dirty="0" smtClean="0"/>
+              <a:t>"}})</a:t>
+            </a:r>
+          </a:p>
+          <a:p>
+            <a:endParaRPr lang="en-US" dirty="0" smtClean="0"/>
+          </a:p>
+          <a:p>
+            <a:r>
+              <a:rPr lang="en-US" dirty="0" err="1" smtClean="0"/>
+              <a:t>db.movies.update</a:t>
+            </a:r>
+            <a:r>
+              <a:rPr lang="en-US" dirty="0" smtClean="0"/>
+              <a:t>({</a:t>
+            </a:r>
+            <a:r>
+              <a:rPr lang="en-US" dirty="0" err="1" smtClean="0"/>
+              <a:t>title:"Batman</a:t>
+            </a:r>
+            <a:r>
+              <a:rPr lang="en-US" dirty="0" smtClean="0"/>
+              <a:t>"}, {$push: {"</a:t>
+            </a:r>
+            <a:r>
+              <a:rPr lang="en-US" dirty="0" err="1" smtClean="0"/>
+              <a:t>details.genre</a:t>
+            </a:r>
+            <a:r>
+              <a:rPr lang="en-US" smtClean="0"/>
+              <a:t>": “Action"}})</a:t>
+            </a:r>
+            <a:endParaRPr lang="en-US" dirty="0" smtClean="0"/>
+          </a:p>
+          <a:p>
+            <a:endParaRPr lang="en-US" dirty="0" smtClean="0"/>
+          </a:p>
+          <a:p>
             <a:endParaRPr lang="en-US" dirty="0"/>
           </a:p>
         </p:txBody>
@@ -2651,12 +2708,26 @@
           <a:p>
             <a:r>
               <a:rPr lang="en-US" dirty="0" smtClean="0"/>
-              <a:t>Example</a:t>
+              <a:t>Mention that mongo has no real schema</a:t>
             </a:r>
             <a:r>
               <a:rPr lang="en-US" baseline="0" dirty="0" smtClean="0"/>
-              <a:t> should be for movies. </a:t>
-            </a:r>
+              <a:t> validation.</a:t>
+            </a:r>
+          </a:p>
+          <a:p>
+            <a:r>
+              <a:rPr lang="en-US" baseline="0" dirty="0" smtClean="0"/>
+              <a:t>Easy to check a field, no way to stop extra fields</a:t>
+            </a:r>
+          </a:p>
+          <a:p>
+            <a:r>
+              <a:rPr lang="en-US" baseline="0" dirty="0" smtClean="0"/>
+              <a:t>Mongoose does have a schema validation built in</a:t>
+            </a:r>
+          </a:p>
+          <a:p>
             <a:endParaRPr lang="en-US" dirty="0"/>
           </a:p>
         </p:txBody>
@@ -2678,7 +2749,7 @@
           <a:p>
             <a:fld id="{7ECDF86E-C09E-4C73-8798-F0685C098AE7}" type="slidenum">
               <a:rPr lang="en-US" smtClean="0"/>
-              <a:t>25</a:t>
+              <a:t>24</a:t>
             </a:fld>
             <a:endParaRPr lang="en-US"/>
           </a:p>
@@ -2687,7 +2758,7 @@
     </p:spTree>
     <p:extLst>
       <p:ext uri="{BB962C8B-B14F-4D97-AF65-F5344CB8AC3E}">
-        <p14:creationId xmlns:p14="http://schemas.microsoft.com/office/powerpoint/2010/main" val="4131411509"/>
+        <p14:creationId xmlns:p14="http://schemas.microsoft.com/office/powerpoint/2010/main" val="194980156"/>
       </p:ext>
     </p:extLst>
   </p:cSld>
@@ -2743,17 +2814,11 @@
           <a:p>
             <a:r>
               <a:rPr lang="en-US" dirty="0" smtClean="0"/>
-              <a:t>Let’s look at the typical TODO app</a:t>
+              <a:t>Example</a:t>
             </a:r>
             <a:r>
               <a:rPr lang="en-US" baseline="0" dirty="0" smtClean="0"/>
-              <a:t> example</a:t>
-            </a:r>
-          </a:p>
-          <a:p>
-            <a:r>
-              <a:rPr lang="en-US" baseline="0" dirty="0" smtClean="0"/>
-              <a:t>Show how it works</a:t>
+              <a:t> should be for movies. </a:t>
             </a:r>
             <a:endParaRPr lang="en-US" dirty="0"/>
           </a:p>
@@ -2776,7 +2841,7 @@
           <a:p>
             <a:fld id="{7ECDF86E-C09E-4C73-8798-F0685C098AE7}" type="slidenum">
               <a:rPr lang="en-US" smtClean="0"/>
-              <a:t>26</a:t>
+              <a:t>25</a:t>
             </a:fld>
             <a:endParaRPr lang="en-US"/>
           </a:p>
@@ -2785,7 +2850,7 @@
     </p:spTree>
     <p:extLst>
       <p:ext uri="{BB962C8B-B14F-4D97-AF65-F5344CB8AC3E}">
-        <p14:creationId xmlns:p14="http://schemas.microsoft.com/office/powerpoint/2010/main" val="929287221"/>
+        <p14:creationId xmlns:p14="http://schemas.microsoft.com/office/powerpoint/2010/main" val="4131411509"/>
       </p:ext>
     </p:extLst>
   </p:cSld>
@@ -2850,10 +2915,94 @@
           </a:p>
           <a:p>
             <a:r>
-              <a:rPr lang="en-US" baseline="0" smtClean="0"/>
+              <a:rPr lang="en-US" baseline="0" dirty="0" smtClean="0"/>
               <a:t>Show how it works</a:t>
             </a:r>
+            <a:endParaRPr lang="en-US" dirty="0"/>
+          </a:p>
+        </p:txBody>
+      </p:sp>
+      <p:sp>
+        <p:nvSpPr>
+          <p:cNvPr id="4" name="Slide Number Placeholder 3"/>
+          <p:cNvSpPr>
+            <a:spLocks noGrp="1"/>
+          </p:cNvSpPr>
+          <p:nvPr>
+            <p:ph type="sldNum" sz="quarter" idx="10"/>
+          </p:nvPr>
+        </p:nvSpPr>
+        <p:spPr/>
+        <p:txBody>
+          <a:bodyPr/>
+          <a:lstStyle/>
+          <a:p>
+            <a:fld id="{7ECDF86E-C09E-4C73-8798-F0685C098AE7}" type="slidenum">
+              <a:rPr lang="en-US" smtClean="0"/>
+              <a:t>26</a:t>
+            </a:fld>
             <a:endParaRPr lang="en-US"/>
+          </a:p>
+        </p:txBody>
+      </p:sp>
+    </p:spTree>
+    <p:extLst>
+      <p:ext uri="{BB962C8B-B14F-4D97-AF65-F5344CB8AC3E}">
+        <p14:creationId xmlns:p14="http://schemas.microsoft.com/office/powerpoint/2010/main" val="929287221"/>
+      </p:ext>
+    </p:extLst>
+  </p:cSld>
+  <p:clrMapOvr>
+    <a:masterClrMapping/>
+  </p:clrMapOvr>
+</p:notes>
+</file>
+
+<file path=ppt/notesSlides/notesSlide25.xml><?xml version="1.0" encoding="utf-8"?>
+<p:notes xmlns:a="http://schemas.openxmlformats.org/drawingml/2006/main" xmlns:r="http://schemas.openxmlformats.org/officeDocument/2006/relationships" xmlns:p="http://schemas.openxmlformats.org/presentationml/2006/main">
+  <p:cSld>
+    <p:spTree>
+      <p:nvGrpSpPr>
+        <p:cNvPr id="1" name=""/>
+        <p:cNvGrpSpPr/>
+        <p:nvPr/>
+      </p:nvGrpSpPr>
+      <p:grpSpPr>
+        <a:xfrm>
+          <a:off x="0" y="0"/>
+          <a:ext cx="0" cy="0"/>
+          <a:chOff x="0" y="0"/>
+          <a:chExt cx="0" cy="0"/>
+        </a:xfrm>
+      </p:grpSpPr>
+      <p:sp>
+        <p:nvSpPr>
+          <p:cNvPr id="2" name="Slide Image Placeholder 1"/>
+          <p:cNvSpPr>
+            <a:spLocks noGrp="1" noRot="1" noChangeAspect="1"/>
+          </p:cNvSpPr>
+          <p:nvPr>
+            <p:ph type="sldImg"/>
+          </p:nvPr>
+        </p:nvSpPr>
+        <p:spPr/>
+      </p:sp>
+      <p:sp>
+        <p:nvSpPr>
+          <p:cNvPr id="3" name="Notes Placeholder 2"/>
+          <p:cNvSpPr>
+            <a:spLocks noGrp="1"/>
+          </p:cNvSpPr>
+          <p:nvPr>
+            <p:ph type="body" idx="1"/>
+          </p:nvPr>
+        </p:nvSpPr>
+        <p:spPr/>
+        <p:txBody>
+          <a:bodyPr/>
+          <a:lstStyle/>
+          <a:p>
+            <a:endParaRPr lang="en-US" dirty="0"/>
           </a:p>
         </p:txBody>
       </p:sp>
@@ -2875,6 +3024,431 @@
             <a:fld id="{7ECDF86E-C09E-4C73-8798-F0685C098AE7}" type="slidenum">
               <a:rPr lang="en-US" smtClean="0"/>
               <a:t>27</a:t>
+            </a:fld>
+            <a:endParaRPr lang="en-US"/>
+          </a:p>
+        </p:txBody>
+      </p:sp>
+    </p:spTree>
+    <p:extLst>
+      <p:ext uri="{BB962C8B-B14F-4D97-AF65-F5344CB8AC3E}">
+        <p14:creationId xmlns:p14="http://schemas.microsoft.com/office/powerpoint/2010/main" val="929287221"/>
+      </p:ext>
+    </p:extLst>
+  </p:cSld>
+  <p:clrMapOvr>
+    <a:masterClrMapping/>
+  </p:clrMapOvr>
+</p:notes>
+</file>
+
+<file path=ppt/notesSlides/notesSlide26.xml><?xml version="1.0" encoding="utf-8"?>
+<p:notes xmlns:a="http://schemas.openxmlformats.org/drawingml/2006/main" xmlns:r="http://schemas.openxmlformats.org/officeDocument/2006/relationships" xmlns:p="http://schemas.openxmlformats.org/presentationml/2006/main">
+  <p:cSld>
+    <p:spTree>
+      <p:nvGrpSpPr>
+        <p:cNvPr id="1" name=""/>
+        <p:cNvGrpSpPr/>
+        <p:nvPr/>
+      </p:nvGrpSpPr>
+      <p:grpSpPr>
+        <a:xfrm>
+          <a:off x="0" y="0"/>
+          <a:ext cx="0" cy="0"/>
+          <a:chOff x="0" y="0"/>
+          <a:chExt cx="0" cy="0"/>
+        </a:xfrm>
+      </p:grpSpPr>
+      <p:sp>
+        <p:nvSpPr>
+          <p:cNvPr id="2" name="Slide Image Placeholder 1"/>
+          <p:cNvSpPr>
+            <a:spLocks noGrp="1" noRot="1" noChangeAspect="1"/>
+          </p:cNvSpPr>
+          <p:nvPr>
+            <p:ph type="sldImg"/>
+          </p:nvPr>
+        </p:nvSpPr>
+        <p:spPr/>
+      </p:sp>
+      <p:sp>
+        <p:nvSpPr>
+          <p:cNvPr id="3" name="Notes Placeholder 2"/>
+          <p:cNvSpPr>
+            <a:spLocks noGrp="1"/>
+          </p:cNvSpPr>
+          <p:nvPr>
+            <p:ph type="body" idx="1"/>
+          </p:nvPr>
+        </p:nvSpPr>
+        <p:spPr/>
+        <p:txBody>
+          <a:bodyPr/>
+          <a:lstStyle/>
+          <a:p>
+            <a:pPr marL="0" marR="0" indent="0" algn="l" defTabSz="914400" rtl="0" eaLnBrk="1" fontAlgn="auto" latinLnBrk="0" hangingPunct="1">
+              <a:lnSpc>
+                <a:spcPct val="100000"/>
+              </a:lnSpc>
+              <a:spcBef>
+                <a:spcPts val="0"/>
+              </a:spcBef>
+              <a:spcAft>
+                <a:spcPts val="0"/>
+              </a:spcAft>
+              <a:buClrTx/>
+              <a:buSzTx/>
+              <a:buFontTx/>
+              <a:buNone/>
+              <a:tabLst/>
+              <a:defRPr/>
+            </a:pPr>
+            <a:r>
+              <a:rPr lang="en-US" dirty="0" smtClean="0"/>
+              <a:t>This</a:t>
+            </a:r>
+            <a:r>
+              <a:rPr lang="en-US" baseline="0" dirty="0" smtClean="0"/>
+              <a:t> example app uses the </a:t>
+            </a:r>
+            <a:r>
+              <a:rPr lang="en-US" baseline="0" dirty="0" err="1" smtClean="0"/>
+              <a:t>mongojs</a:t>
+            </a:r>
+            <a:r>
+              <a:rPr lang="en-US" baseline="0" dirty="0" smtClean="0"/>
+              <a:t> node module to talk to </a:t>
+            </a:r>
+            <a:r>
+              <a:rPr lang="en-US" baseline="0" dirty="0" err="1" smtClean="0"/>
+              <a:t>MongoDB</a:t>
+            </a:r>
+            <a:r>
+              <a:rPr lang="en-US" baseline="0" dirty="0" smtClean="0"/>
+              <a:t>.  It gives you a simple way to execute mongo commands.  You can see the update command looks like you are in the mongo shell.  </a:t>
+            </a:r>
+            <a:endParaRPr lang="en-US" dirty="0"/>
+          </a:p>
+        </p:txBody>
+      </p:sp>
+      <p:sp>
+        <p:nvSpPr>
+          <p:cNvPr id="4" name="Slide Number Placeholder 3"/>
+          <p:cNvSpPr>
+            <a:spLocks noGrp="1"/>
+          </p:cNvSpPr>
+          <p:nvPr>
+            <p:ph type="sldNum" sz="quarter" idx="10"/>
+          </p:nvPr>
+        </p:nvSpPr>
+        <p:spPr/>
+        <p:txBody>
+          <a:bodyPr/>
+          <a:lstStyle/>
+          <a:p>
+            <a:fld id="{7ECDF86E-C09E-4C73-8798-F0685C098AE7}" type="slidenum">
+              <a:rPr lang="en-US" smtClean="0"/>
+              <a:t>28</a:t>
+            </a:fld>
+            <a:endParaRPr lang="en-US"/>
+          </a:p>
+        </p:txBody>
+      </p:sp>
+    </p:spTree>
+    <p:extLst>
+      <p:ext uri="{BB962C8B-B14F-4D97-AF65-F5344CB8AC3E}">
+        <p14:creationId xmlns:p14="http://schemas.microsoft.com/office/powerpoint/2010/main" val="912051105"/>
+      </p:ext>
+    </p:extLst>
+  </p:cSld>
+  <p:clrMapOvr>
+    <a:masterClrMapping/>
+  </p:clrMapOvr>
+</p:notes>
+</file>
+
+<file path=ppt/notesSlides/notesSlide27.xml><?xml version="1.0" encoding="utf-8"?>
+<p:notes xmlns:a="http://schemas.openxmlformats.org/drawingml/2006/main" xmlns:r="http://schemas.openxmlformats.org/officeDocument/2006/relationships" xmlns:p="http://schemas.openxmlformats.org/presentationml/2006/main">
+  <p:cSld>
+    <p:spTree>
+      <p:nvGrpSpPr>
+        <p:cNvPr id="1" name=""/>
+        <p:cNvGrpSpPr/>
+        <p:nvPr/>
+      </p:nvGrpSpPr>
+      <p:grpSpPr>
+        <a:xfrm>
+          <a:off x="0" y="0"/>
+          <a:ext cx="0" cy="0"/>
+          <a:chOff x="0" y="0"/>
+          <a:chExt cx="0" cy="0"/>
+        </a:xfrm>
+      </p:grpSpPr>
+      <p:sp>
+        <p:nvSpPr>
+          <p:cNvPr id="2" name="Slide Image Placeholder 1"/>
+          <p:cNvSpPr>
+            <a:spLocks noGrp="1" noRot="1" noChangeAspect="1"/>
+          </p:cNvSpPr>
+          <p:nvPr>
+            <p:ph type="sldImg"/>
+          </p:nvPr>
+        </p:nvSpPr>
+        <p:spPr/>
+      </p:sp>
+      <p:sp>
+        <p:nvSpPr>
+          <p:cNvPr id="3" name="Notes Placeholder 2"/>
+          <p:cNvSpPr>
+            <a:spLocks noGrp="1"/>
+          </p:cNvSpPr>
+          <p:nvPr>
+            <p:ph type="body" idx="1"/>
+          </p:nvPr>
+        </p:nvSpPr>
+        <p:spPr/>
+        <p:txBody>
+          <a:bodyPr/>
+          <a:lstStyle/>
+          <a:p>
+            <a:pPr marL="0" marR="0" indent="0" algn="l" defTabSz="914400" rtl="0" eaLnBrk="1" fontAlgn="auto" latinLnBrk="0" hangingPunct="1">
+              <a:lnSpc>
+                <a:spcPct val="100000"/>
+              </a:lnSpc>
+              <a:spcBef>
+                <a:spcPts val="0"/>
+              </a:spcBef>
+              <a:spcAft>
+                <a:spcPts val="0"/>
+              </a:spcAft>
+              <a:buClrTx/>
+              <a:buSzTx/>
+              <a:buFontTx/>
+              <a:buNone/>
+              <a:tabLst/>
+              <a:defRPr/>
+            </a:pPr>
+            <a:r>
+              <a:rPr lang="en-US" baseline="0" dirty="0" smtClean="0"/>
+              <a:t>The only oddity here is that since we are just passing the </a:t>
+            </a:r>
+            <a:r>
+              <a:rPr lang="en-US" baseline="0" dirty="0" err="1" smtClean="0"/>
+              <a:t>json</a:t>
+            </a:r>
+            <a:r>
+              <a:rPr lang="en-US" baseline="0" dirty="0" smtClean="0"/>
+              <a:t> request on, we remove the _id first.</a:t>
+            </a:r>
+            <a:endParaRPr lang="en-US" dirty="0" smtClean="0"/>
+          </a:p>
+          <a:p>
+            <a:endParaRPr lang="en-US" dirty="0"/>
+          </a:p>
+        </p:txBody>
+      </p:sp>
+      <p:sp>
+        <p:nvSpPr>
+          <p:cNvPr id="4" name="Slide Number Placeholder 3"/>
+          <p:cNvSpPr>
+            <a:spLocks noGrp="1"/>
+          </p:cNvSpPr>
+          <p:nvPr>
+            <p:ph type="sldNum" sz="quarter" idx="10"/>
+          </p:nvPr>
+        </p:nvSpPr>
+        <p:spPr/>
+        <p:txBody>
+          <a:bodyPr/>
+          <a:lstStyle/>
+          <a:p>
+            <a:fld id="{7ECDF86E-C09E-4C73-8798-F0685C098AE7}" type="slidenum">
+              <a:rPr lang="en-US" smtClean="0"/>
+              <a:t>29</a:t>
+            </a:fld>
+            <a:endParaRPr lang="en-US"/>
+          </a:p>
+        </p:txBody>
+      </p:sp>
+    </p:spTree>
+    <p:extLst>
+      <p:ext uri="{BB962C8B-B14F-4D97-AF65-F5344CB8AC3E}">
+        <p14:creationId xmlns:p14="http://schemas.microsoft.com/office/powerpoint/2010/main" val="912051105"/>
+      </p:ext>
+    </p:extLst>
+  </p:cSld>
+  <p:clrMapOvr>
+    <a:masterClrMapping/>
+  </p:clrMapOvr>
+</p:notes>
+</file>
+
+<file path=ppt/notesSlides/notesSlide28.xml><?xml version="1.0" encoding="utf-8"?>
+<p:notes xmlns:a="http://schemas.openxmlformats.org/drawingml/2006/main" xmlns:r="http://schemas.openxmlformats.org/officeDocument/2006/relationships" xmlns:p="http://schemas.openxmlformats.org/presentationml/2006/main">
+  <p:cSld>
+    <p:spTree>
+      <p:nvGrpSpPr>
+        <p:cNvPr id="1" name=""/>
+        <p:cNvGrpSpPr/>
+        <p:nvPr/>
+      </p:nvGrpSpPr>
+      <p:grpSpPr>
+        <a:xfrm>
+          <a:off x="0" y="0"/>
+          <a:ext cx="0" cy="0"/>
+          <a:chOff x="0" y="0"/>
+          <a:chExt cx="0" cy="0"/>
+        </a:xfrm>
+      </p:grpSpPr>
+      <p:sp>
+        <p:nvSpPr>
+          <p:cNvPr id="2" name="Slide Image Placeholder 1"/>
+          <p:cNvSpPr>
+            <a:spLocks noGrp="1" noRot="1" noChangeAspect="1"/>
+          </p:cNvSpPr>
+          <p:nvPr>
+            <p:ph type="sldImg"/>
+          </p:nvPr>
+        </p:nvSpPr>
+        <p:spPr/>
+      </p:sp>
+      <p:sp>
+        <p:nvSpPr>
+          <p:cNvPr id="3" name="Notes Placeholder 2"/>
+          <p:cNvSpPr>
+            <a:spLocks noGrp="1"/>
+          </p:cNvSpPr>
+          <p:nvPr>
+            <p:ph type="body" idx="1"/>
+          </p:nvPr>
+        </p:nvSpPr>
+        <p:spPr/>
+        <p:txBody>
+          <a:bodyPr/>
+          <a:lstStyle/>
+          <a:p>
+            <a:r>
+              <a:rPr lang="en-US" dirty="0" smtClean="0"/>
+              <a:t>So we are going</a:t>
+            </a:r>
+            <a:r>
+              <a:rPr lang="en-US" baseline="0" dirty="0" smtClean="0"/>
+              <a:t> to add a favorite star icon to identify </a:t>
+            </a:r>
+            <a:r>
+              <a:rPr lang="en-US" baseline="0" dirty="0" err="1" smtClean="0"/>
+              <a:t>todos</a:t>
+            </a:r>
+            <a:r>
+              <a:rPr lang="en-US" baseline="0" dirty="0" smtClean="0"/>
+              <a:t> as high priority.</a:t>
+            </a:r>
+            <a:endParaRPr lang="en-US" dirty="0"/>
+          </a:p>
+        </p:txBody>
+      </p:sp>
+      <p:sp>
+        <p:nvSpPr>
+          <p:cNvPr id="4" name="Slide Number Placeholder 3"/>
+          <p:cNvSpPr>
+            <a:spLocks noGrp="1"/>
+          </p:cNvSpPr>
+          <p:nvPr>
+            <p:ph type="sldNum" sz="quarter" idx="10"/>
+          </p:nvPr>
+        </p:nvSpPr>
+        <p:spPr/>
+        <p:txBody>
+          <a:bodyPr/>
+          <a:lstStyle/>
+          <a:p>
+            <a:fld id="{7ECDF86E-C09E-4C73-8798-F0685C098AE7}" type="slidenum">
+              <a:rPr lang="en-US" smtClean="0"/>
+              <a:t>30</a:t>
+            </a:fld>
+            <a:endParaRPr lang="en-US"/>
+          </a:p>
+        </p:txBody>
+      </p:sp>
+    </p:spTree>
+    <p:extLst>
+      <p:ext uri="{BB962C8B-B14F-4D97-AF65-F5344CB8AC3E}">
+        <p14:creationId xmlns:p14="http://schemas.microsoft.com/office/powerpoint/2010/main" val="3652462619"/>
+      </p:ext>
+    </p:extLst>
+  </p:cSld>
+  <p:clrMapOvr>
+    <a:masterClrMapping/>
+  </p:clrMapOvr>
+</p:notes>
+</file>
+
+<file path=ppt/notesSlides/notesSlide29.xml><?xml version="1.0" encoding="utf-8"?>
+<p:notes xmlns:a="http://schemas.openxmlformats.org/drawingml/2006/main" xmlns:r="http://schemas.openxmlformats.org/officeDocument/2006/relationships" xmlns:p="http://schemas.openxmlformats.org/presentationml/2006/main">
+  <p:cSld>
+    <p:spTree>
+      <p:nvGrpSpPr>
+        <p:cNvPr id="1" name=""/>
+        <p:cNvGrpSpPr/>
+        <p:nvPr/>
+      </p:nvGrpSpPr>
+      <p:grpSpPr>
+        <a:xfrm>
+          <a:off x="0" y="0"/>
+          <a:ext cx="0" cy="0"/>
+          <a:chOff x="0" y="0"/>
+          <a:chExt cx="0" cy="0"/>
+        </a:xfrm>
+      </p:grpSpPr>
+      <p:sp>
+        <p:nvSpPr>
+          <p:cNvPr id="2" name="Slide Image Placeholder 1"/>
+          <p:cNvSpPr>
+            <a:spLocks noGrp="1" noRot="1" noChangeAspect="1"/>
+          </p:cNvSpPr>
+          <p:nvPr>
+            <p:ph type="sldImg"/>
+          </p:nvPr>
+        </p:nvSpPr>
+        <p:spPr/>
+      </p:sp>
+      <p:sp>
+        <p:nvSpPr>
+          <p:cNvPr id="3" name="Notes Placeholder 2"/>
+          <p:cNvSpPr>
+            <a:spLocks noGrp="1"/>
+          </p:cNvSpPr>
+          <p:nvPr>
+            <p:ph type="body" idx="1"/>
+          </p:nvPr>
+        </p:nvSpPr>
+        <p:spPr/>
+        <p:txBody>
+          <a:bodyPr/>
+          <a:lstStyle/>
+          <a:p>
+            <a:endParaRPr lang="en-US" dirty="0"/>
+          </a:p>
+        </p:txBody>
+      </p:sp>
+      <p:sp>
+        <p:nvSpPr>
+          <p:cNvPr id="4" name="Slide Number Placeholder 3"/>
+          <p:cNvSpPr>
+            <a:spLocks noGrp="1"/>
+          </p:cNvSpPr>
+          <p:nvPr>
+            <p:ph type="sldNum" sz="quarter" idx="10"/>
+          </p:nvPr>
+        </p:nvSpPr>
+        <p:spPr/>
+        <p:txBody>
+          <a:bodyPr/>
+          <a:lstStyle/>
+          <a:p>
+            <a:fld id="{7ECDF86E-C09E-4C73-8798-F0685C098AE7}" type="slidenum">
+              <a:rPr lang="en-US" smtClean="0"/>
+              <a:t>31</a:t>
             </a:fld>
             <a:endParaRPr lang="en-US"/>
           </a:p>
@@ -4336,7 +4910,7 @@
           <a:p>
             <a:fld id="{2ADC2C9B-E509-4817-BA72-5DA0722D8BF9}" type="datetimeFigureOut">
               <a:rPr lang="en-US" smtClean="0"/>
-              <a:t>6/3/2017</a:t>
+              <a:t>6/15/2017</a:t>
             </a:fld>
             <a:endParaRPr lang="en-US"/>
           </a:p>
@@ -4506,7 +5080,7 @@
           <a:p>
             <a:fld id="{2ADC2C9B-E509-4817-BA72-5DA0722D8BF9}" type="datetimeFigureOut">
               <a:rPr lang="en-US" smtClean="0"/>
-              <a:t>6/3/2017</a:t>
+              <a:t>6/15/2017</a:t>
             </a:fld>
             <a:endParaRPr lang="en-US"/>
           </a:p>
@@ -4686,7 +5260,7 @@
           <a:p>
             <a:fld id="{2ADC2C9B-E509-4817-BA72-5DA0722D8BF9}" type="datetimeFigureOut">
               <a:rPr lang="en-US" smtClean="0"/>
-              <a:t>6/3/2017</a:t>
+              <a:t>6/15/2017</a:t>
             </a:fld>
             <a:endParaRPr lang="en-US"/>
           </a:p>
@@ -4856,7 +5430,7 @@
           <a:p>
             <a:fld id="{2ADC2C9B-E509-4817-BA72-5DA0722D8BF9}" type="datetimeFigureOut">
               <a:rPr lang="en-US" smtClean="0"/>
-              <a:t>6/3/2017</a:t>
+              <a:t>6/15/2017</a:t>
             </a:fld>
             <a:endParaRPr lang="en-US"/>
           </a:p>
@@ -5102,7 +5676,7 @@
           <a:p>
             <a:fld id="{2ADC2C9B-E509-4817-BA72-5DA0722D8BF9}" type="datetimeFigureOut">
               <a:rPr lang="en-US" smtClean="0"/>
-              <a:t>6/3/2017</a:t>
+              <a:t>6/15/2017</a:t>
             </a:fld>
             <a:endParaRPr lang="en-US"/>
           </a:p>
@@ -5390,7 +5964,7 @@
           <a:p>
             <a:fld id="{2ADC2C9B-E509-4817-BA72-5DA0722D8BF9}" type="datetimeFigureOut">
               <a:rPr lang="en-US" smtClean="0"/>
-              <a:t>6/3/2017</a:t>
+              <a:t>6/15/2017</a:t>
             </a:fld>
             <a:endParaRPr lang="en-US"/>
           </a:p>
@@ -5812,7 +6386,7 @@
           <a:p>
             <a:fld id="{2ADC2C9B-E509-4817-BA72-5DA0722D8BF9}" type="datetimeFigureOut">
               <a:rPr lang="en-US" smtClean="0"/>
-              <a:t>6/3/2017</a:t>
+              <a:t>6/15/2017</a:t>
             </a:fld>
             <a:endParaRPr lang="en-US"/>
           </a:p>
@@ -5930,7 +6504,7 @@
           <a:p>
             <a:fld id="{2ADC2C9B-E509-4817-BA72-5DA0722D8BF9}" type="datetimeFigureOut">
               <a:rPr lang="en-US" smtClean="0"/>
-              <a:t>6/3/2017</a:t>
+              <a:t>6/15/2017</a:t>
             </a:fld>
             <a:endParaRPr lang="en-US"/>
           </a:p>
@@ -6025,7 +6599,7 @@
           <a:p>
             <a:fld id="{2ADC2C9B-E509-4817-BA72-5DA0722D8BF9}" type="datetimeFigureOut">
               <a:rPr lang="en-US" smtClean="0"/>
-              <a:t>6/3/2017</a:t>
+              <a:t>6/15/2017</a:t>
             </a:fld>
             <a:endParaRPr lang="en-US"/>
           </a:p>
@@ -6302,7 +6876,7 @@
           <a:p>
             <a:fld id="{2ADC2C9B-E509-4817-BA72-5DA0722D8BF9}" type="datetimeFigureOut">
               <a:rPr lang="en-US" smtClean="0"/>
-              <a:t>6/3/2017</a:t>
+              <a:t>6/15/2017</a:t>
             </a:fld>
             <a:endParaRPr lang="en-US"/>
           </a:p>
@@ -6555,7 +7129,7 @@
           <a:p>
             <a:fld id="{2ADC2C9B-E509-4817-BA72-5DA0722D8BF9}" type="datetimeFigureOut">
               <a:rPr lang="en-US" smtClean="0"/>
-              <a:t>6/3/2017</a:t>
+              <a:t>6/15/2017</a:t>
             </a:fld>
             <a:endParaRPr lang="en-US"/>
           </a:p>
@@ -6768,7 +7342,7 @@
           <a:p>
             <a:fld id="{2ADC2C9B-E509-4817-BA72-5DA0722D8BF9}" type="datetimeFigureOut">
               <a:rPr lang="en-US" smtClean="0"/>
-              <a:t>6/3/2017</a:t>
+              <a:t>6/15/2017</a:t>
             </a:fld>
             <a:endParaRPr lang="en-US"/>
           </a:p>
@@ -7433,7 +8007,7 @@
           <a:p>
             <a:r>
               <a:rPr lang="en-US" b="1" dirty="0" smtClean="0"/>
-              <a:t>Creating Documents</a:t>
+              <a:t>Getting started: insert data</a:t>
             </a:r>
             <a:endParaRPr lang="en-US" b="1" dirty="0"/>
           </a:p>
@@ -7451,142 +8025,257 @@
         </p:nvSpPr>
         <p:spPr/>
         <p:txBody>
-          <a:bodyPr/>
-          <a:lstStyle/>
-          <a:p>
-            <a:pPr marL="0" indent="0">
-              <a:buNone/>
-            </a:pPr>
-            <a:r>
-              <a:rPr lang="en-US" dirty="0"/>
-              <a:t>	</a:t>
-            </a:r>
-            <a:r>
-              <a:rPr lang="en-US" dirty="0" smtClean="0"/>
-              <a:t>save() will create a document</a:t>
-            </a:r>
-            <a:r>
-              <a:rPr lang="en-US" sz="2800" dirty="0" smtClean="0"/>
+          <a:bodyPr>
+            <a:normAutofit fontScale="85000" lnSpcReduction="20000"/>
+          </a:bodyPr>
+          <a:lstStyle/>
+          <a:p>
+            <a:pPr marL="0" indent="0">
+              <a:buNone/>
+            </a:pPr>
+            <a:r>
+              <a:rPr lang="en-US" sz="3800" dirty="0" smtClean="0"/>
+              <a:t>Grab slides and run insert script: </a:t>
+            </a:r>
+          </a:p>
+          <a:p>
+            <a:pPr lvl="1"/>
+            <a:r>
+              <a:rPr lang="en-US" b="1" dirty="0" smtClean="0">
+                <a:latin typeface="Arial Unicode MS" panose="020B0604020202020204" pitchFamily="34" charset="-128"/>
+                <a:ea typeface="Arial Unicode MS" panose="020B0604020202020204" pitchFamily="34" charset="-128"/>
+                <a:cs typeface="Arial Unicode MS" panose="020B0604020202020204" pitchFamily="34" charset="-128"/>
+              </a:rPr>
+              <a:t>From </a:t>
+            </a:r>
+            <a:r>
+              <a:rPr lang="en-US" b="1" dirty="0" err="1" smtClean="0">
+                <a:latin typeface="Arial Unicode MS" panose="020B0604020202020204" pitchFamily="34" charset="-128"/>
+                <a:ea typeface="Arial Unicode MS" panose="020B0604020202020204" pitchFamily="34" charset="-128"/>
+                <a:cs typeface="Arial Unicode MS" panose="020B0604020202020204" pitchFamily="34" charset="-128"/>
+              </a:rPr>
+              <a:t>Git</a:t>
+            </a:r>
+            <a:r>
+              <a:rPr lang="en-US" b="1" dirty="0" smtClean="0">
+                <a:latin typeface="Arial Unicode MS" panose="020B0604020202020204" pitchFamily="34" charset="-128"/>
+                <a:ea typeface="Arial Unicode MS" panose="020B0604020202020204" pitchFamily="34" charset="-128"/>
+                <a:cs typeface="Arial Unicode MS" panose="020B0604020202020204" pitchFamily="34" charset="-128"/>
+              </a:rPr>
               <a:t>:</a:t>
             </a:r>
           </a:p>
           <a:p>
-            <a:pPr marL="0" indent="0">
-              <a:buNone/>
-            </a:pPr>
-            <a:r>
-              <a:rPr lang="en-US" dirty="0"/>
-              <a:t>	</a:t>
-            </a:r>
-            <a:r>
-              <a:rPr lang="en-US" dirty="0" smtClean="0"/>
-              <a:t>	</a:t>
-            </a:r>
-            <a:r>
-              <a:rPr lang="en-US" sz="2800" b="1" dirty="0" smtClean="0">
+            <a:pPr marL="857250" lvl="2" indent="0">
+              <a:buNone/>
+            </a:pPr>
+            <a:r>
+              <a:rPr lang="en-US" b="1" dirty="0">
                 <a:latin typeface="Arial Unicode MS" panose="020B0604020202020204" pitchFamily="34" charset="-128"/>
                 <a:ea typeface="Arial Unicode MS" panose="020B0604020202020204" pitchFamily="34" charset="-128"/>
                 <a:cs typeface="Arial Unicode MS" panose="020B0604020202020204" pitchFamily="34" charset="-128"/>
               </a:rPr>
-              <a:t>db.&lt;collection&gt;.save(document)</a:t>
-            </a:r>
-          </a:p>
-          <a:p>
-            <a:pPr marL="0" indent="0">
-              <a:buNone/>
-            </a:pPr>
-            <a:r>
-              <a:rPr lang="en-US" sz="2800" dirty="0" smtClean="0"/>
-              <a:t>	find() will query documents:</a:t>
-            </a:r>
-          </a:p>
-          <a:p>
-            <a:pPr marL="0" indent="0">
-              <a:buNone/>
-            </a:pPr>
-            <a:r>
-              <a:rPr lang="en-US" sz="2800" dirty="0" smtClean="0"/>
-              <a:t>		</a:t>
-            </a:r>
-            <a:r>
-              <a:rPr lang="en-US" sz="2800" b="1" dirty="0" smtClean="0">
+              <a:t>https://</a:t>
+            </a:r>
+            <a:r>
+              <a:rPr lang="en-US" b="1" dirty="0" err="1">
                 <a:latin typeface="Arial Unicode MS" panose="020B0604020202020204" pitchFamily="34" charset="-128"/>
                 <a:ea typeface="Arial Unicode MS" panose="020B0604020202020204" pitchFamily="34" charset="-128"/>
                 <a:cs typeface="Arial Unicode MS" panose="020B0604020202020204" pitchFamily="34" charset="-128"/>
               </a:rPr>
-              <a:t>db.&lt;collection&gt;.find()</a:t>
-            </a:r>
-          </a:p>
-          <a:p>
-            <a:pPr marL="0" indent="0">
-              <a:buNone/>
-            </a:pPr>
-            <a:r>
-              <a:rPr lang="en-US" sz="2800" b="1" dirty="0">
+              <a:t>github.com</a:t>
+            </a:r>
+            <a:r>
+              <a:rPr lang="en-US" b="1" dirty="0">
                 <a:latin typeface="Arial Unicode MS" panose="020B0604020202020204" pitchFamily="34" charset="-128"/>
                 <a:ea typeface="Arial Unicode MS" panose="020B0604020202020204" pitchFamily="34" charset="-128"/>
                 <a:cs typeface="Arial Unicode MS" panose="020B0604020202020204" pitchFamily="34" charset="-128"/>
               </a:rPr>
-              <a:t>	</a:t>
-            </a:r>
-            <a:r>
-              <a:rPr lang="en-US" sz="2800" dirty="0" smtClean="0"/>
-              <a:t>find().pretty() will pretty print documents:</a:t>
-            </a:r>
-          </a:p>
-          <a:p>
-            <a:pPr marL="0" indent="0">
-              <a:buNone/>
-            </a:pPr>
-            <a:r>
-              <a:rPr lang="en-US" sz="2800" dirty="0" smtClean="0"/>
-              <a:t>		</a:t>
-            </a:r>
-            <a:r>
-              <a:rPr lang="en-US" sz="2800" b="1" dirty="0" smtClean="0">
+              <a:t>/</a:t>
+            </a:r>
+            <a:r>
+              <a:rPr lang="en-US" b="1" dirty="0" err="1">
                 <a:latin typeface="Arial Unicode MS" panose="020B0604020202020204" pitchFamily="34" charset="-128"/>
                 <a:ea typeface="Arial Unicode MS" panose="020B0604020202020204" pitchFamily="34" charset="-128"/>
                 <a:cs typeface="Arial Unicode MS" panose="020B0604020202020204" pitchFamily="34" charset="-128"/>
               </a:rPr>
-              <a:t>db.&lt;collection&gt;.find().pretty()</a:t>
-            </a:r>
-          </a:p>
-          <a:p>
-            <a:pPr marL="0" indent="0">
-              <a:buNone/>
-            </a:pPr>
-            <a:endParaRPr lang="en-US" sz="2800" b="1" dirty="0" smtClean="0">
+              <a:t>dvanvali</a:t>
+            </a:r>
+            <a:r>
+              <a:rPr lang="en-US" b="1" dirty="0">
+                <a:latin typeface="Arial Unicode MS" panose="020B0604020202020204" pitchFamily="34" charset="-128"/>
+                <a:ea typeface="Arial Unicode MS" panose="020B0604020202020204" pitchFamily="34" charset="-128"/>
+                <a:cs typeface="Arial Unicode MS" panose="020B0604020202020204" pitchFamily="34" charset="-128"/>
+              </a:rPr>
+              <a:t>/</a:t>
+            </a:r>
+            <a:r>
+              <a:rPr lang="en-US" b="1" dirty="0" err="1" smtClean="0">
+                <a:latin typeface="Arial Unicode MS" panose="020B0604020202020204" pitchFamily="34" charset="-128"/>
+                <a:ea typeface="Arial Unicode MS" panose="020B0604020202020204" pitchFamily="34" charset="-128"/>
+                <a:cs typeface="Arial Unicode MS" panose="020B0604020202020204" pitchFamily="34" charset="-128"/>
+              </a:rPr>
+              <a:t>mongoDbPresentation</a:t>
+            </a:r>
+            <a:endParaRPr lang="en-US" b="1" dirty="0" smtClean="0">
               <a:latin typeface="Arial Unicode MS" panose="020B0604020202020204" pitchFamily="34" charset="-128"/>
               <a:ea typeface="Arial Unicode MS" panose="020B0604020202020204" pitchFamily="34" charset="-128"/>
               <a:cs typeface="Arial Unicode MS" panose="020B0604020202020204" pitchFamily="34" charset="-128"/>
             </a:endParaRPr>
           </a:p>
           <a:p>
-            <a:pPr marL="0" indent="0">
-              <a:buNone/>
-            </a:pPr>
-            <a:endParaRPr lang="en-US" sz="2800" b="1" dirty="0" smtClean="0">
-              <a:latin typeface="Arial Unicode MS" panose="020B0604020202020204" pitchFamily="34" charset="-128"/>
-              <a:ea typeface="Arial Unicode MS" panose="020B0604020202020204" pitchFamily="34" charset="-128"/>
-              <a:cs typeface="Arial Unicode MS" panose="020B0604020202020204" pitchFamily="34" charset="-128"/>
-            </a:endParaRPr>
-          </a:p>
-          <a:p>
-            <a:pPr marL="0" indent="0">
-              <a:buNone/>
-            </a:pPr>
-            <a:endParaRPr lang="en-US" sz="2800" b="1" dirty="0">
-              <a:latin typeface="Arial Unicode MS" panose="020B0604020202020204" pitchFamily="34" charset="-128"/>
-              <a:ea typeface="Arial Unicode MS" panose="020B0604020202020204" pitchFamily="34" charset="-128"/>
-              <a:cs typeface="Arial Unicode MS" panose="020B0604020202020204" pitchFamily="34" charset="-128"/>
-            </a:endParaRPr>
+            <a:pPr lvl="1"/>
+            <a:r>
+              <a:rPr lang="en-US" b="1" dirty="0" smtClean="0">
+                <a:latin typeface="Arial Unicode MS" panose="020B0604020202020204" pitchFamily="34" charset="-128"/>
+                <a:ea typeface="Arial Unicode MS" panose="020B0604020202020204" pitchFamily="34" charset="-128"/>
+                <a:cs typeface="Arial Unicode MS" panose="020B0604020202020204" pitchFamily="34" charset="-128"/>
+              </a:rPr>
+              <a:t>From the Wiki:</a:t>
+            </a:r>
+          </a:p>
+          <a:p>
+            <a:pPr marL="857250" lvl="2" indent="0">
+              <a:buNone/>
+            </a:pPr>
+            <a:r>
+              <a:rPr lang="en-US" b="1" dirty="0" smtClean="0">
+                <a:latin typeface="Arial Unicode MS" panose="020B0604020202020204" pitchFamily="34" charset="-128"/>
+                <a:ea typeface="Arial Unicode MS" panose="020B0604020202020204" pitchFamily="34" charset="-128"/>
+                <a:cs typeface="Arial Unicode MS" panose="020B0604020202020204" pitchFamily="34" charset="-128"/>
+              </a:rPr>
+              <a:t>&lt;fill me in&gt;</a:t>
+            </a:r>
+          </a:p>
+          <a:p>
+            <a:pPr lvl="1"/>
+            <a:r>
+              <a:rPr lang="en-US" dirty="0" smtClean="0"/>
+              <a:t>Insert data from the script</a:t>
+            </a:r>
+          </a:p>
+          <a:p>
+            <a:pPr marL="914400" lvl="2" indent="0">
+              <a:buNone/>
+            </a:pPr>
+            <a:r>
+              <a:rPr lang="en-US" dirty="0"/>
+              <a:t>c</a:t>
+            </a:r>
+            <a:r>
+              <a:rPr lang="en-US" dirty="0" smtClean="0"/>
+              <a:t>d </a:t>
+            </a:r>
+            <a:r>
+              <a:rPr lang="en-US" dirty="0" err="1" smtClean="0"/>
+              <a:t>mongoDbPresentation</a:t>
+            </a:r>
+            <a:endParaRPr lang="en-US" dirty="0" smtClean="0"/>
+          </a:p>
+          <a:p>
+            <a:pPr marL="914400" lvl="2" indent="0">
+              <a:buNone/>
+            </a:pPr>
+            <a:r>
+              <a:rPr lang="en-US" dirty="0"/>
+              <a:t>m</a:t>
+            </a:r>
+            <a:r>
+              <a:rPr lang="en-US" dirty="0" smtClean="0"/>
+              <a:t>ongo </a:t>
+            </a:r>
+            <a:r>
+              <a:rPr lang="en-US" dirty="0" err="1" smtClean="0"/>
+              <a:t>moviesForMongo.js</a:t>
+            </a:r>
+            <a:endParaRPr lang="en-US" dirty="0" smtClean="0"/>
+          </a:p>
+          <a:p>
+            <a:pPr lvl="1"/>
+            <a:r>
+              <a:rPr lang="en-US" dirty="0" smtClean="0"/>
+              <a:t>Check to see that data is there</a:t>
+            </a:r>
+          </a:p>
+          <a:p>
+            <a:pPr marL="857250" lvl="2" indent="0">
+              <a:buNone/>
+            </a:pPr>
+            <a:r>
+              <a:rPr lang="en-US" dirty="0" smtClean="0"/>
+              <a:t>$ mongo</a:t>
+            </a:r>
+          </a:p>
+          <a:p>
+            <a:pPr marL="857250" lvl="2" indent="0">
+              <a:buNone/>
+            </a:pPr>
+            <a:r>
+              <a:rPr lang="en-US" dirty="0" smtClean="0"/>
+              <a:t>&gt; </a:t>
+            </a:r>
+            <a:r>
+              <a:rPr lang="en-US" dirty="0"/>
+              <a:t>u</a:t>
+            </a:r>
+            <a:r>
+              <a:rPr lang="en-US" dirty="0" smtClean="0"/>
+              <a:t>se test</a:t>
+            </a:r>
+          </a:p>
+          <a:p>
+            <a:pPr marL="857250" lvl="2" indent="0">
+              <a:buNone/>
+            </a:pPr>
+            <a:r>
+              <a:rPr lang="en-US" dirty="0" smtClean="0"/>
+              <a:t>&gt; </a:t>
+            </a:r>
+            <a:r>
+              <a:rPr lang="en-US" dirty="0" err="1" smtClean="0"/>
+              <a:t>db.movies.find</a:t>
+            </a:r>
+            <a:r>
+              <a:rPr lang="en-US" dirty="0" smtClean="0"/>
+              <a:t>().count()</a:t>
+            </a:r>
+          </a:p>
+          <a:p>
+            <a:pPr marL="857250" lvl="2" indent="0">
+              <a:buNone/>
+            </a:pPr>
+            <a:r>
+              <a:rPr lang="en-US" dirty="0" smtClean="0"/>
+              <a:t>12</a:t>
+            </a:r>
+          </a:p>
+          <a:p>
+            <a:pPr marL="914400" lvl="2" indent="0">
+              <a:buNone/>
+            </a:pPr>
+            <a:endParaRPr lang="en-US" dirty="0"/>
+          </a:p>
+          <a:p>
+            <a:pPr marL="914400" lvl="2" indent="0">
+              <a:buNone/>
+            </a:pPr>
+            <a:endParaRPr lang="en-US" dirty="0" smtClean="0"/>
+          </a:p>
+          <a:p>
+            <a:pPr marL="914400" lvl="2" indent="0">
+              <a:buNone/>
+            </a:pPr>
+            <a:endParaRPr lang="en-US" dirty="0" smtClean="0"/>
+          </a:p>
+          <a:p>
+            <a:endParaRPr lang="en-US" dirty="0"/>
           </a:p>
         </p:txBody>
       </p:sp>
     </p:spTree>
     <p:extLst>
       <p:ext uri="{BB962C8B-B14F-4D97-AF65-F5344CB8AC3E}">
-        <p14:creationId xmlns:p14="http://schemas.microsoft.com/office/powerpoint/2010/main" val="91337677"/>
+        <p14:creationId xmlns:p14="http://schemas.microsoft.com/office/powerpoint/2010/main" val="2055031690"/>
       </p:ext>
     </p:extLst>
   </p:cSld>
@@ -7657,12 +8346,72 @@
               <a:buNone/>
             </a:pPr>
             <a:r>
+              <a:rPr lang="en-US" sz="2800" b="1" dirty="0">
+                <a:latin typeface="Arial Unicode MS" panose="020B0604020202020204" pitchFamily="34" charset="-128"/>
+                <a:ea typeface="Arial Unicode MS" panose="020B0604020202020204" pitchFamily="34" charset="-128"/>
+                <a:cs typeface="Arial Unicode MS" panose="020B0604020202020204" pitchFamily="34" charset="-128"/>
+              </a:rPr>
+              <a:t>db.&lt;collection&gt;.find</a:t>
+            </a:r>
+            <a:r>
               <a:rPr lang="en-US" sz="2800" b="1" dirty="0" smtClean="0">
                 <a:latin typeface="Arial Unicode MS" panose="020B0604020202020204" pitchFamily="34" charset="-128"/>
                 <a:ea typeface="Arial Unicode MS" panose="020B0604020202020204" pitchFamily="34" charset="-128"/>
                 <a:cs typeface="Arial Unicode MS" panose="020B0604020202020204" pitchFamily="34" charset="-128"/>
               </a:rPr>
+              <a:t>() </a:t>
+            </a:r>
+          </a:p>
+          <a:p>
+            <a:pPr marL="400050" lvl="1" indent="0">
+              <a:buNone/>
+            </a:pPr>
+            <a:r>
+              <a:rPr lang="en-US" sz="2400" b="1" dirty="0" smtClean="0">
+                <a:latin typeface="Arial Unicode MS" panose="020B0604020202020204" pitchFamily="34" charset="-128"/>
+                <a:ea typeface="Arial Unicode MS" panose="020B0604020202020204" pitchFamily="34" charset="-128"/>
+                <a:cs typeface="Arial Unicode MS" panose="020B0604020202020204" pitchFamily="34" charset="-128"/>
+              </a:rPr>
+              <a:t>– queries everything</a:t>
+            </a:r>
+            <a:endParaRPr lang="en-US" sz="2400" b="1" dirty="0">
+              <a:latin typeface="Arial Unicode MS" panose="020B0604020202020204" pitchFamily="34" charset="-128"/>
+              <a:ea typeface="Arial Unicode MS" panose="020B0604020202020204" pitchFamily="34" charset="-128"/>
+              <a:cs typeface="Arial Unicode MS" panose="020B0604020202020204" pitchFamily="34" charset="-128"/>
+            </a:endParaRPr>
+          </a:p>
+          <a:p>
+            <a:pPr marL="0" indent="0">
+              <a:buNone/>
+            </a:pPr>
+            <a:endParaRPr lang="en-US" sz="2800" b="1" dirty="0" smtClean="0">
+              <a:latin typeface="Arial Unicode MS" panose="020B0604020202020204" pitchFamily="34" charset="-128"/>
+              <a:ea typeface="Arial Unicode MS" panose="020B0604020202020204" pitchFamily="34" charset="-128"/>
+              <a:cs typeface="Arial Unicode MS" panose="020B0604020202020204" pitchFamily="34" charset="-128"/>
+            </a:endParaRPr>
+          </a:p>
+          <a:p>
+            <a:pPr marL="0" indent="0">
+              <a:buNone/>
+            </a:pPr>
+            <a:r>
+              <a:rPr lang="en-US" sz="2800" b="1" dirty="0" smtClean="0">
+                <a:latin typeface="Arial Unicode MS" panose="020B0604020202020204" pitchFamily="34" charset="-128"/>
+                <a:ea typeface="Arial Unicode MS" panose="020B0604020202020204" pitchFamily="34" charset="-128"/>
+                <a:cs typeface="Arial Unicode MS" panose="020B0604020202020204" pitchFamily="34" charset="-128"/>
+              </a:rPr>
               <a:t>db.&lt;collection&gt;.find(selector, projection)</a:t>
+            </a:r>
+          </a:p>
+          <a:p>
+            <a:pPr lvl="1" indent="-342900"/>
+            <a:r>
+              <a:rPr lang="en-US" sz="2400" b="1" dirty="0" smtClean="0">
+                <a:latin typeface="Arial Unicode MS" panose="020B0604020202020204" pitchFamily="34" charset="-128"/>
+                <a:ea typeface="Arial Unicode MS" panose="020B0604020202020204" pitchFamily="34" charset="-128"/>
+                <a:cs typeface="Arial Unicode MS" panose="020B0604020202020204" pitchFamily="34" charset="-128"/>
+              </a:rPr>
+              <a:t>Selects documents and limits fields selected</a:t>
             </a:r>
           </a:p>
           <a:p>
@@ -7694,6 +8443,30 @@
                 <a:cs typeface="Arial Unicode MS" panose="020B0604020202020204" pitchFamily="34" charset="-128"/>
               </a:rPr>
               <a:t>({title: “The Incredibles”}, {plot: 1})</a:t>
+            </a:r>
+            <a:endParaRPr lang="en-US" sz="2800" b="1" dirty="0">
+              <a:latin typeface="Arial Unicode MS" panose="020B0604020202020204" pitchFamily="34" charset="-128"/>
+              <a:ea typeface="Arial Unicode MS" panose="020B0604020202020204" pitchFamily="34" charset="-128"/>
+              <a:cs typeface="Arial Unicode MS" panose="020B0604020202020204" pitchFamily="34" charset="-128"/>
+            </a:endParaRPr>
+          </a:p>
+          <a:p>
+            <a:pPr lvl="1" indent="-342900"/>
+            <a:r>
+              <a:rPr lang="en-US" sz="2400" b="1" dirty="0">
+                <a:latin typeface="Arial Unicode MS" panose="020B0604020202020204" pitchFamily="34" charset="-128"/>
+                <a:ea typeface="Arial Unicode MS" panose="020B0604020202020204" pitchFamily="34" charset="-128"/>
+                <a:cs typeface="Arial Unicode MS" panose="020B0604020202020204" pitchFamily="34" charset="-128"/>
+              </a:rPr>
+              <a:t>a</a:t>
+            </a:r>
+            <a:r>
+              <a:rPr lang="en-US" sz="2400" b="1" dirty="0" smtClean="0">
+                <a:latin typeface="Arial Unicode MS" panose="020B0604020202020204" pitchFamily="34" charset="-128"/>
+                <a:ea typeface="Arial Unicode MS" panose="020B0604020202020204" pitchFamily="34" charset="-128"/>
+                <a:cs typeface="Arial Unicode MS" panose="020B0604020202020204" pitchFamily="34" charset="-128"/>
+              </a:rPr>
+              <a:t>dding .pretty() will format the output</a:t>
             </a:r>
           </a:p>
           <a:p>
@@ -9156,7 +9929,12 @@
             <p:ph idx="1"/>
           </p:nvPr>
         </p:nvSpPr>
-        <p:spPr/>
+        <p:spPr>
+          <a:xfrm>
+            <a:off x="457200" y="1600200"/>
+            <a:ext cx="8382000" cy="4525963"/>
+          </a:xfrm>
+        </p:spPr>
         <p:txBody>
           <a:bodyPr>
             <a:normAutofit/>
@@ -9167,7 +9945,7 @@
               <a:buNone/>
             </a:pPr>
             <a:r>
-              <a:rPr lang="en-US" sz="1800" b="1" dirty="0" err="1" smtClean="0">
+              <a:rPr lang="en-US" sz="2400" b="1" dirty="0" err="1" smtClean="0">
                 <a:latin typeface="Arial Unicode MS" panose="020B0604020202020204" pitchFamily="34" charset="-128"/>
                 <a:ea typeface="Arial Unicode MS" panose="020B0604020202020204" pitchFamily="34" charset="-128"/>
                 <a:cs typeface="Arial Unicode MS" panose="020B0604020202020204" pitchFamily="34" charset="-128"/>
@@ -9175,7 +9953,7 @@
               <a:t>db.movies.update</a:t>
             </a:r>
             <a:r>
-              <a:rPr lang="en-US" sz="1800" b="1" dirty="0" smtClean="0">
+              <a:rPr lang="en-US" sz="2400" b="1" dirty="0" smtClean="0">
                 <a:latin typeface="Arial Unicode MS" panose="020B0604020202020204" pitchFamily="34" charset="-128"/>
                 <a:ea typeface="Arial Unicode MS" panose="020B0604020202020204" pitchFamily="34" charset="-128"/>
                 <a:cs typeface="Arial Unicode MS" panose="020B0604020202020204" pitchFamily="34" charset="-128"/>
@@ -9187,7 +9965,7 @@
             <a:pPr marL="0" indent="0">
               <a:buNone/>
             </a:pPr>
-            <a:endParaRPr lang="en-US" sz="1800" b="1" dirty="0">
+            <a:endParaRPr lang="en-US" sz="2400" b="1" dirty="0">
               <a:latin typeface="Arial Unicode MS" panose="020B0604020202020204" pitchFamily="34" charset="-128"/>
               <a:ea typeface="Arial Unicode MS" panose="020B0604020202020204" pitchFamily="34" charset="-128"/>
               <a:cs typeface="Arial Unicode MS" panose="020B0604020202020204" pitchFamily="34" charset="-128"/>
@@ -9198,7 +9976,7 @@
               <a:buNone/>
             </a:pPr>
             <a:r>
-              <a:rPr lang="en-US" sz="1800" b="1" dirty="0" err="1" smtClean="0">
+              <a:rPr lang="en-US" sz="2400" b="1" dirty="0" err="1" smtClean="0">
                 <a:latin typeface="Arial Unicode MS" panose="020B0604020202020204" pitchFamily="34" charset="-128"/>
                 <a:ea typeface="Arial Unicode MS" panose="020B0604020202020204" pitchFamily="34" charset="-128"/>
                 <a:cs typeface="Arial Unicode MS" panose="020B0604020202020204" pitchFamily="34" charset="-128"/>
@@ -9206,23 +9984,57 @@
               <a:t>db.movies.update</a:t>
             </a:r>
             <a:r>
-              <a:rPr lang="en-US" sz="1800" b="1" dirty="0">
+              <a:rPr lang="en-US" sz="2400" b="1" dirty="0">
                 <a:latin typeface="Arial Unicode MS" panose="020B0604020202020204" pitchFamily="34" charset="-128"/>
                 <a:ea typeface="Arial Unicode MS" panose="020B0604020202020204" pitchFamily="34" charset="-128"/>
                 <a:cs typeface="Arial Unicode MS" panose="020B0604020202020204" pitchFamily="34" charset="-128"/>
               </a:rPr>
-              <a:t>({title: "The Incredibles"}, {$set: {</a:t>
-            </a:r>
-            <a:r>
-              <a:rPr lang="en-US" sz="1800" b="1" dirty="0" err="1">
+              <a:t>({title: "The Incredibles"}, </a:t>
+            </a:r>
+            <a:endParaRPr lang="en-US" sz="2400" b="1" dirty="0" smtClean="0">
+              <a:latin typeface="Arial Unicode MS" panose="020B0604020202020204" pitchFamily="34" charset="-128"/>
+              <a:ea typeface="Arial Unicode MS" panose="020B0604020202020204" pitchFamily="34" charset="-128"/>
+              <a:cs typeface="Arial Unicode MS" panose="020B0604020202020204" pitchFamily="34" charset="-128"/>
+            </a:endParaRPr>
+          </a:p>
+          <a:p>
+            <a:pPr marL="0" indent="0">
+              <a:buNone/>
+            </a:pPr>
+            <a:r>
+              <a:rPr lang="en-US" sz="2400" b="1" dirty="0">
                 <a:latin typeface="Arial Unicode MS" panose="020B0604020202020204" pitchFamily="34" charset="-128"/>
                 <a:ea typeface="Arial Unicode MS" panose="020B0604020202020204" pitchFamily="34" charset="-128"/>
                 <a:cs typeface="Arial Unicode MS" panose="020B0604020202020204" pitchFamily="34" charset="-128"/>
               </a:rPr>
+              <a:t> </a:t>
+            </a:r>
+            <a:r>
+              <a:rPr lang="en-US" sz="2400" b="1" dirty="0" smtClean="0">
+                <a:latin typeface="Arial Unicode MS" panose="020B0604020202020204" pitchFamily="34" charset="-128"/>
+                <a:ea typeface="Arial Unicode MS" panose="020B0604020202020204" pitchFamily="34" charset="-128"/>
+                <a:cs typeface="Arial Unicode MS" panose="020B0604020202020204" pitchFamily="34" charset="-128"/>
+              </a:rPr>
+              <a:t>        {</a:t>
+            </a:r>
+            <a:r>
+              <a:rPr lang="en-US" sz="2400" b="1" dirty="0">
+                <a:latin typeface="Arial Unicode MS" panose="020B0604020202020204" pitchFamily="34" charset="-128"/>
+                <a:ea typeface="Arial Unicode MS" panose="020B0604020202020204" pitchFamily="34" charset="-128"/>
+                <a:cs typeface="Arial Unicode MS" panose="020B0604020202020204" pitchFamily="34" charset="-128"/>
+              </a:rPr>
+              <a:t>$set: {</a:t>
+            </a:r>
+            <a:r>
+              <a:rPr lang="en-US" sz="2400" b="1" dirty="0" err="1">
+                <a:latin typeface="Arial Unicode MS" panose="020B0604020202020204" pitchFamily="34" charset="-128"/>
+                <a:ea typeface="Arial Unicode MS" panose="020B0604020202020204" pitchFamily="34" charset="-128"/>
+                <a:cs typeface="Arial Unicode MS" panose="020B0604020202020204" pitchFamily="34" charset="-128"/>
+              </a:rPr>
               <a:t>boxOffice</a:t>
             </a:r>
             <a:r>
-              <a:rPr lang="en-US" sz="1800" b="1" dirty="0">
+              <a:rPr lang="en-US" sz="2400" b="1" dirty="0">
                 <a:latin typeface="Arial Unicode MS" panose="020B0604020202020204" pitchFamily="34" charset="-128"/>
                 <a:ea typeface="Arial Unicode MS" panose="020B0604020202020204" pitchFamily="34" charset="-128"/>
                 <a:cs typeface="Arial Unicode MS" panose="020B0604020202020204" pitchFamily="34" charset="-128"/>
@@ -9230,14 +10042,14 @@
               <a:t>: "$261,441,092</a:t>
             </a:r>
             <a:r>
-              <a:rPr lang="en-US" sz="1800" b="1" dirty="0" smtClean="0">
+              <a:rPr lang="en-US" sz="2400" b="1" dirty="0" smtClean="0">
                 <a:latin typeface="Arial Unicode MS" panose="020B0604020202020204" pitchFamily="34" charset="-128"/>
                 <a:ea typeface="Arial Unicode MS" panose="020B0604020202020204" pitchFamily="34" charset="-128"/>
                 <a:cs typeface="Arial Unicode MS" panose="020B0604020202020204" pitchFamily="34" charset="-128"/>
               </a:rPr>
               <a:t>"}})</a:t>
             </a:r>
-            <a:endParaRPr lang="en-US" sz="1800" b="1" dirty="0">
+            <a:endParaRPr lang="en-US" sz="2400" b="1" dirty="0">
               <a:latin typeface="Arial Unicode MS" panose="020B0604020202020204" pitchFamily="34" charset="-128"/>
               <a:ea typeface="Arial Unicode MS" panose="020B0604020202020204" pitchFamily="34" charset="-128"/>
               <a:cs typeface="Arial Unicode MS" panose="020B0604020202020204" pitchFamily="34" charset="-128"/>
@@ -9339,7 +10151,7 @@
           <a:p>
             <a:r>
               <a:rPr lang="en-US" dirty="0" smtClean="0"/>
-              <a:t>BSON (close to JSON)</a:t>
+              <a:t>Document Store</a:t>
             </a:r>
             <a:endParaRPr lang="en-US" dirty="0"/>
           </a:p>
@@ -9758,46 +10570,128 @@
               <a:buNone/>
             </a:pPr>
             <a:r>
-              <a:rPr lang="en-US" sz="1600" b="1" dirty="0" smtClean="0">
+              <a:rPr lang="en-US" sz="2800" b="1" dirty="0" smtClean="0">
                 <a:ea typeface="Arial Unicode MS" panose="020B0604020202020204" pitchFamily="34" charset="-128"/>
                 <a:cs typeface="Arial Unicode MS" panose="020B0604020202020204" pitchFamily="34" charset="-128"/>
               </a:rPr>
               <a:t>Add a </a:t>
             </a:r>
             <a:r>
-              <a:rPr lang="en-US" sz="1600" b="1" dirty="0" err="1" smtClean="0">
+              <a:rPr lang="en-US" sz="2800" b="1" dirty="0" err="1" smtClean="0">
                 <a:ea typeface="Arial Unicode MS" panose="020B0604020202020204" pitchFamily="34" charset="-128"/>
                 <a:cs typeface="Arial Unicode MS" panose="020B0604020202020204" pitchFamily="34" charset="-128"/>
               </a:rPr>
               <a:t>boxOffice</a:t>
             </a:r>
             <a:r>
-              <a:rPr lang="en-US" sz="1600" b="1" dirty="0" smtClean="0">
-                <a:ea typeface="Arial Unicode MS" panose="020B0604020202020204" pitchFamily="34" charset="-128"/>
-                <a:cs typeface="Arial Unicode MS" panose="020B0604020202020204" pitchFamily="34" charset="-128"/>
-              </a:rPr>
-              <a:t> of ?? To Batman</a:t>
-            </a:r>
-          </a:p>
-          <a:p>
-            <a:pPr marL="0" indent="0">
-              <a:buNone/>
-            </a:pPr>
-            <a:endParaRPr lang="en-US" sz="1600" b="1" dirty="0" smtClean="0">
+              <a:rPr lang="en-US" sz="2800" b="1" dirty="0" smtClean="0">
+                <a:ea typeface="Arial Unicode MS" panose="020B0604020202020204" pitchFamily="34" charset="-128"/>
+                <a:cs typeface="Arial Unicode MS" panose="020B0604020202020204" pitchFamily="34" charset="-128"/>
+              </a:rPr>
+              <a:t> </a:t>
+            </a:r>
+            <a:r>
+              <a:rPr lang="en-US" sz="2800" b="1" dirty="0" smtClean="0">
+                <a:ea typeface="Arial Unicode MS" panose="020B0604020202020204" pitchFamily="34" charset="-128"/>
+                <a:cs typeface="Arial Unicode MS" panose="020B0604020202020204" pitchFamily="34" charset="-128"/>
+              </a:rPr>
+              <a:t>of value of </a:t>
+            </a:r>
+            <a:r>
+              <a:rPr lang="en-US" sz="2800" b="1" dirty="0" smtClean="0"/>
+              <a:t>$251,188,924</a:t>
+            </a:r>
+            <a:r>
+              <a:rPr lang="en-US" sz="2800" b="1" dirty="0" smtClean="0">
+                <a:ea typeface="Arial Unicode MS" panose="020B0604020202020204" pitchFamily="34" charset="-128"/>
+                <a:cs typeface="Arial Unicode MS" panose="020B0604020202020204" pitchFamily="34" charset="-128"/>
+              </a:rPr>
+              <a:t> To Batman.</a:t>
+            </a:r>
+            <a:endParaRPr lang="en-US" sz="2800" b="1" dirty="0" smtClean="0">
               <a:ea typeface="Arial Unicode MS" panose="020B0604020202020204" pitchFamily="34" charset="-128"/>
               <a:cs typeface="Arial Unicode MS" panose="020B0604020202020204" pitchFamily="34" charset="-128"/>
             </a:endParaRPr>
           </a:p>
           <a:p>
-            <a:pPr marL="0" indent="0">
-              <a:buNone/>
-            </a:pPr>
-            <a:r>
-              <a:rPr lang="en-US" sz="1600" b="1" dirty="0" smtClean="0">
-                <a:ea typeface="Arial Unicode MS" panose="020B0604020202020204" pitchFamily="34" charset="-128"/>
-                <a:cs typeface="Arial Unicode MS" panose="020B0604020202020204" pitchFamily="34" charset="-128"/>
-              </a:rPr>
-              <a:t>Add “Action” and “Adventure” to the genre for “The Incredibles” (note that it is a scalar value).  Check to see it now has three genres.</a:t>
+            <a:endParaRPr lang="en-US" sz="2800" b="1" dirty="0" smtClean="0">
+              <a:ea typeface="Arial Unicode MS" panose="020B0604020202020204" pitchFamily="34" charset="-128"/>
+              <a:cs typeface="Arial Unicode MS" panose="020B0604020202020204" pitchFamily="34" charset="-128"/>
+            </a:endParaRPr>
+          </a:p>
+          <a:p>
+            <a:pPr marL="0" indent="0">
+              <a:buNone/>
+            </a:pPr>
+            <a:r>
+              <a:rPr lang="en-US" sz="2800" b="1" dirty="0" smtClean="0">
+                <a:ea typeface="Arial Unicode MS" panose="020B0604020202020204" pitchFamily="34" charset="-128"/>
+                <a:cs typeface="Arial Unicode MS" panose="020B0604020202020204" pitchFamily="34" charset="-128"/>
+              </a:rPr>
+              <a:t>Add “” to the actors for </a:t>
+            </a:r>
+            <a:r>
+              <a:rPr lang="en-US" sz="2800" b="1" dirty="0" smtClean="0">
+                <a:ea typeface="Arial Unicode MS" panose="020B0604020202020204" pitchFamily="34" charset="-128"/>
+                <a:cs typeface="Arial Unicode MS" panose="020B0604020202020204" pitchFamily="34" charset="-128"/>
+              </a:rPr>
+              <a:t>Batman.</a:t>
+            </a:r>
+          </a:p>
+          <a:p>
+            <a:pPr marL="0" indent="0">
+              <a:buNone/>
+            </a:pPr>
+            <a:endParaRPr lang="en-US" sz="2800" b="1" dirty="0" smtClean="0">
+              <a:ea typeface="Arial Unicode MS" panose="020B0604020202020204" pitchFamily="34" charset="-128"/>
+              <a:cs typeface="Arial Unicode MS" panose="020B0604020202020204" pitchFamily="34" charset="-128"/>
+            </a:endParaRPr>
+          </a:p>
+          <a:p>
+            <a:pPr marL="0" indent="0">
+              <a:buNone/>
+            </a:pPr>
+            <a:r>
+              <a:rPr lang="en-US" sz="2800" b="1" dirty="0" smtClean="0">
+                <a:ea typeface="Arial Unicode MS" panose="020B0604020202020204" pitchFamily="34" charset="-128"/>
+                <a:cs typeface="Arial Unicode MS" panose="020B0604020202020204" pitchFamily="34" charset="-128"/>
+              </a:rPr>
+              <a:t>Add </a:t>
+            </a:r>
+            <a:r>
+              <a:rPr lang="en-US" sz="2800" b="1" dirty="0" smtClean="0">
+                <a:ea typeface="Arial Unicode MS" panose="020B0604020202020204" pitchFamily="34" charset="-128"/>
+                <a:cs typeface="Arial Unicode MS" panose="020B0604020202020204" pitchFamily="34" charset="-128"/>
+              </a:rPr>
+              <a:t>“Action</a:t>
+            </a:r>
+            <a:r>
+              <a:rPr lang="en-US" sz="2800" b="1" dirty="0" smtClean="0">
+                <a:ea typeface="Arial Unicode MS" panose="020B0604020202020204" pitchFamily="34" charset="-128"/>
+                <a:cs typeface="Arial Unicode MS" panose="020B0604020202020204" pitchFamily="34" charset="-128"/>
+              </a:rPr>
+              <a:t>” to </a:t>
+            </a:r>
+            <a:r>
+              <a:rPr lang="en-US" sz="2800" b="1" dirty="0" smtClean="0">
+                <a:ea typeface="Arial Unicode MS" panose="020B0604020202020204" pitchFamily="34" charset="-128"/>
+                <a:cs typeface="Arial Unicode MS" panose="020B0604020202020204" pitchFamily="34" charset="-128"/>
+              </a:rPr>
+              <a:t>the genre for “The </a:t>
+            </a:r>
+            <a:r>
+              <a:rPr lang="en-US" sz="2800" b="1" smtClean="0">
+                <a:ea typeface="Arial Unicode MS" panose="020B0604020202020204" pitchFamily="34" charset="-128"/>
+                <a:cs typeface="Arial Unicode MS" panose="020B0604020202020204" pitchFamily="34" charset="-128"/>
+              </a:rPr>
+              <a:t>Incredibles”.  </a:t>
+            </a:r>
+            <a:r>
+              <a:rPr lang="en-US" sz="2800" b="1" dirty="0" smtClean="0">
+                <a:ea typeface="Arial Unicode MS" panose="020B0604020202020204" pitchFamily="34" charset="-128"/>
+                <a:cs typeface="Arial Unicode MS" panose="020B0604020202020204" pitchFamily="34" charset="-128"/>
+              </a:rPr>
+              <a:t>Check to see it now has three genres.</a:t>
             </a:r>
           </a:p>
           <a:p>
@@ -9921,33 +10815,111 @@
               <a:buNone/>
             </a:pPr>
             <a:r>
-              <a:rPr lang="en-US" sz="1600" b="1" dirty="0" smtClean="0">
-                <a:ea typeface="Arial Unicode MS" panose="020B0604020202020204" pitchFamily="34" charset="-128"/>
-                <a:cs typeface="Arial Unicode MS" panose="020B0604020202020204" pitchFamily="34" charset="-128"/>
-              </a:rPr>
-              <a:t>$unset</a:t>
-            </a:r>
-          </a:p>
-          <a:p>
-            <a:pPr marL="0" indent="0">
-              <a:buNone/>
-            </a:pPr>
-            <a:r>
-              <a:rPr lang="en-US" sz="1600" b="1" dirty="0" smtClean="0">
-                <a:ea typeface="Arial Unicode MS" panose="020B0604020202020204" pitchFamily="34" charset="-128"/>
-                <a:cs typeface="Arial Unicode MS" panose="020B0604020202020204" pitchFamily="34" charset="-128"/>
-              </a:rPr>
-              <a:t>What else?</a:t>
-            </a:r>
-          </a:p>
-          <a:p>
-            <a:pPr marL="0" indent="0">
-              <a:buNone/>
-            </a:pPr>
-            <a:endParaRPr lang="en-US" sz="1600" b="1" dirty="0">
-              <a:ea typeface="Arial Unicode MS" panose="020B0604020202020204" pitchFamily="34" charset="-128"/>
-              <a:cs typeface="Arial Unicode MS" panose="020B0604020202020204" pitchFamily="34" charset="-128"/>
-            </a:endParaRPr>
+              <a:rPr lang="en-US" sz="2000" b="1" dirty="0">
+                <a:ea typeface="Arial Unicode MS" panose="020B0604020202020204" pitchFamily="34" charset="-128"/>
+                <a:cs typeface="Arial Unicode MS" panose="020B0604020202020204" pitchFamily="34" charset="-128"/>
+              </a:rPr>
+              <a:t>$</a:t>
+            </a:r>
+            <a:r>
+              <a:rPr lang="en-US" sz="2000" b="1" dirty="0" err="1">
+                <a:ea typeface="Arial Unicode MS" panose="020B0604020202020204" pitchFamily="34" charset="-128"/>
+                <a:cs typeface="Arial Unicode MS" panose="020B0604020202020204" pitchFamily="34" charset="-128"/>
+              </a:rPr>
+              <a:t>inc</a:t>
+            </a:r>
+            <a:r>
+              <a:rPr lang="en-US" sz="2000" b="1" dirty="0">
+                <a:ea typeface="Arial Unicode MS" panose="020B0604020202020204" pitchFamily="34" charset="-128"/>
+                <a:cs typeface="Arial Unicode MS" panose="020B0604020202020204" pitchFamily="34" charset="-128"/>
+              </a:rPr>
+              <a:t>	</a:t>
+            </a:r>
+            <a:r>
+              <a:rPr lang="en-US" sz="2000" b="1" dirty="0" smtClean="0">
+                <a:ea typeface="Arial Unicode MS" panose="020B0604020202020204" pitchFamily="34" charset="-128"/>
+                <a:cs typeface="Arial Unicode MS" panose="020B0604020202020204" pitchFamily="34" charset="-128"/>
+              </a:rPr>
+              <a:t>   Increments </a:t>
+            </a:r>
+            <a:r>
+              <a:rPr lang="en-US" sz="2000" b="1" dirty="0">
+                <a:ea typeface="Arial Unicode MS" panose="020B0604020202020204" pitchFamily="34" charset="-128"/>
+                <a:cs typeface="Arial Unicode MS" panose="020B0604020202020204" pitchFamily="34" charset="-128"/>
+              </a:rPr>
+              <a:t>the value of the field by the specified amount.</a:t>
+            </a:r>
+          </a:p>
+          <a:p>
+            <a:pPr marL="0" indent="0">
+              <a:buNone/>
+            </a:pPr>
+            <a:r>
+              <a:rPr lang="en-US" sz="2000" b="1" dirty="0">
+                <a:ea typeface="Arial Unicode MS" panose="020B0604020202020204" pitchFamily="34" charset="-128"/>
+                <a:cs typeface="Arial Unicode MS" panose="020B0604020202020204" pitchFamily="34" charset="-128"/>
+              </a:rPr>
+              <a:t>$</a:t>
+            </a:r>
+            <a:r>
+              <a:rPr lang="en-US" sz="2000" b="1" dirty="0" err="1">
+                <a:ea typeface="Arial Unicode MS" panose="020B0604020202020204" pitchFamily="34" charset="-128"/>
+                <a:cs typeface="Arial Unicode MS" panose="020B0604020202020204" pitchFamily="34" charset="-128"/>
+              </a:rPr>
+              <a:t>mul</a:t>
+            </a:r>
+            <a:r>
+              <a:rPr lang="en-US" sz="2000" b="1" dirty="0">
+                <a:ea typeface="Arial Unicode MS" panose="020B0604020202020204" pitchFamily="34" charset="-128"/>
+                <a:cs typeface="Arial Unicode MS" panose="020B0604020202020204" pitchFamily="34" charset="-128"/>
+              </a:rPr>
+              <a:t>	</a:t>
+            </a:r>
+            <a:r>
+              <a:rPr lang="en-US" sz="2000" b="1" dirty="0" smtClean="0">
+                <a:ea typeface="Arial Unicode MS" panose="020B0604020202020204" pitchFamily="34" charset="-128"/>
+                <a:cs typeface="Arial Unicode MS" panose="020B0604020202020204" pitchFamily="34" charset="-128"/>
+              </a:rPr>
+              <a:t>   Multiplies </a:t>
+            </a:r>
+            <a:r>
+              <a:rPr lang="en-US" sz="2000" b="1" dirty="0">
+                <a:ea typeface="Arial Unicode MS" panose="020B0604020202020204" pitchFamily="34" charset="-128"/>
+                <a:cs typeface="Arial Unicode MS" panose="020B0604020202020204" pitchFamily="34" charset="-128"/>
+              </a:rPr>
+              <a:t>the value of the field by the specified amount.</a:t>
+            </a:r>
+          </a:p>
+          <a:p>
+            <a:pPr marL="0" indent="0">
+              <a:buNone/>
+            </a:pPr>
+            <a:r>
+              <a:rPr lang="en-US" sz="2000" b="1" dirty="0">
+                <a:ea typeface="Arial Unicode MS" panose="020B0604020202020204" pitchFamily="34" charset="-128"/>
+                <a:cs typeface="Arial Unicode MS" panose="020B0604020202020204" pitchFamily="34" charset="-128"/>
+              </a:rPr>
+              <a:t>$unset	   Removes the specified field from a document.</a:t>
+            </a:r>
+          </a:p>
+          <a:p>
+            <a:pPr marL="0" indent="0">
+              <a:buNone/>
+            </a:pPr>
+            <a:r>
+              <a:rPr lang="en-US" sz="2000" b="1" dirty="0" smtClean="0">
+                <a:ea typeface="Arial Unicode MS" panose="020B0604020202020204" pitchFamily="34" charset="-128"/>
+                <a:cs typeface="Arial Unicode MS" panose="020B0604020202020204" pitchFamily="34" charset="-128"/>
+              </a:rPr>
+              <a:t>$rename   Renames </a:t>
+            </a:r>
+            <a:r>
+              <a:rPr lang="en-US" sz="2000" b="1" dirty="0">
+                <a:ea typeface="Arial Unicode MS" panose="020B0604020202020204" pitchFamily="34" charset="-128"/>
+                <a:cs typeface="Arial Unicode MS" panose="020B0604020202020204" pitchFamily="34" charset="-128"/>
+              </a:rPr>
+              <a:t>a field.</a:t>
+            </a:r>
           </a:p>
           <a:p>
             <a:pPr marL="0" indent="0">
@@ -10202,6 +11174,16 @@
                 <a:ea typeface="Arial Unicode MS" panose="020B0604020202020204" pitchFamily="34" charset="-128"/>
                 <a:cs typeface="Arial Unicode MS" panose="020B0604020202020204" pitchFamily="34" charset="-128"/>
               </a:rPr>
+              <a:t>A selector that must pass</a:t>
+            </a:r>
+          </a:p>
+          <a:p>
+            <a:r>
+              <a:rPr lang="en-US" sz="2800" dirty="0" smtClean="0">
+                <a:latin typeface="Arial Unicode MS" panose="020B0604020202020204" pitchFamily="34" charset="-128"/>
+                <a:ea typeface="Arial Unicode MS" panose="020B0604020202020204" pitchFamily="34" charset="-128"/>
+                <a:cs typeface="Arial Unicode MS" panose="020B0604020202020204" pitchFamily="34" charset="-128"/>
+              </a:rPr>
               <a:t>Can be set to different levels</a:t>
             </a:r>
           </a:p>
@@ -10228,44 +11210,6 @@
             </a:r>
           </a:p>
           <a:p>
-            <a:r>
-              <a:rPr lang="en-US" sz="2800" dirty="0" err="1" smtClean="0">
-                <a:latin typeface="Arial Unicode MS" panose="020B0604020202020204" pitchFamily="34" charset="-128"/>
-                <a:ea typeface="Arial Unicode MS" panose="020B0604020202020204" pitchFamily="34" charset="-128"/>
-                <a:cs typeface="Arial Unicode MS" panose="020B0604020202020204" pitchFamily="34" charset="-128"/>
-              </a:rPr>
-              <a:t>validationAction</a:t>
-            </a:r>
-            <a:r>
-              <a:rPr lang="en-US" sz="2800" dirty="0" smtClean="0">
-                <a:latin typeface="Arial Unicode MS" panose="020B0604020202020204" pitchFamily="34" charset="-128"/>
-                <a:ea typeface="Arial Unicode MS" panose="020B0604020202020204" pitchFamily="34" charset="-128"/>
-                <a:cs typeface="Arial Unicode MS" panose="020B0604020202020204" pitchFamily="34" charset="-128"/>
-              </a:rPr>
-              <a:t> determines what to do upon failure</a:t>
-            </a:r>
-          </a:p>
-          <a:p>
-            <a:pPr lvl="1"/>
-            <a:r>
-              <a:rPr lang="en-US" sz="2400" dirty="0" smtClean="0">
-                <a:latin typeface="Arial Unicode MS" panose="020B0604020202020204" pitchFamily="34" charset="-128"/>
-                <a:ea typeface="Arial Unicode MS" panose="020B0604020202020204" pitchFamily="34" charset="-128"/>
-                <a:cs typeface="Arial Unicode MS" panose="020B0604020202020204" pitchFamily="34" charset="-128"/>
-              </a:rPr>
-              <a:t>Error – stops the modification</a:t>
-            </a:r>
-          </a:p>
-          <a:p>
-            <a:pPr lvl="1"/>
-            <a:r>
-              <a:rPr lang="en-US" sz="2400" dirty="0" smtClean="0">
-                <a:latin typeface="Arial Unicode MS" panose="020B0604020202020204" pitchFamily="34" charset="-128"/>
-                <a:ea typeface="Arial Unicode MS" panose="020B0604020202020204" pitchFamily="34" charset="-128"/>
-                <a:cs typeface="Arial Unicode MS" panose="020B0604020202020204" pitchFamily="34" charset="-128"/>
-              </a:rPr>
-              <a:t>Warn – logs the violation, but allows the modification</a:t>
-            </a:r>
             <a:endParaRPr lang="en-US" sz="2400" dirty="0">
               <a:latin typeface="Arial Unicode MS" panose="020B0604020202020204" pitchFamily="34" charset="-128"/>
               <a:ea typeface="Arial Unicode MS" panose="020B0604020202020204" pitchFamily="34" charset="-128"/>
@@ -10647,8 +11591,8 @@
           <a:lstStyle/>
           <a:p>
             <a:r>
-              <a:rPr lang="en-US" smtClean="0"/>
-              <a:t>MEAN example</a:t>
+              <a:rPr lang="en-US" dirty="0" smtClean="0"/>
+              <a:t>Angular Controller</a:t>
             </a:r>
             <a:endParaRPr lang="en-US" dirty="0"/>
           </a:p>
@@ -10666,32 +11610,273 @@
         </p:nvSpPr>
         <p:spPr/>
         <p:txBody>
-          <a:bodyPr/>
-          <a:lstStyle/>
-          <a:p>
+          <a:bodyPr>
+            <a:normAutofit fontScale="55000" lnSpcReduction="20000"/>
+          </a:bodyPr>
+          <a:lstStyle/>
+          <a:p>
+            <a:pPr marL="0" indent="0">
+              <a:buNone/>
+            </a:pPr>
+            <a:r>
+              <a:rPr lang="en-US" dirty="0"/>
+              <a:t> $</a:t>
+            </a:r>
+            <a:r>
+              <a:rPr lang="en-US" dirty="0" err="1"/>
+              <a:t>scope.updateStatus</a:t>
+            </a:r>
+            <a:r>
+              <a:rPr lang="en-US" dirty="0"/>
+              <a:t> = function($event, _id, </a:t>
+            </a:r>
+            <a:r>
+              <a:rPr lang="en-US" dirty="0" err="1"/>
+              <a:t>i</a:t>
+            </a:r>
+            <a:r>
+              <a:rPr lang="en-US" dirty="0"/>
+              <a:t>) {</a:t>
+            </a:r>
+          </a:p>
+          <a:p>
+            <a:pPr marL="0" indent="0">
+              <a:buNone/>
+            </a:pPr>
+            <a:r>
+              <a:rPr lang="en-US" dirty="0"/>
+              <a:t>    </a:t>
+            </a:r>
+            <a:r>
+              <a:rPr lang="en-US" dirty="0" err="1"/>
+              <a:t>var</a:t>
+            </a:r>
+            <a:r>
+              <a:rPr lang="en-US" dirty="0"/>
+              <a:t> </a:t>
+            </a:r>
+            <a:r>
+              <a:rPr lang="en-US" dirty="0" err="1"/>
+              <a:t>cbk</a:t>
+            </a:r>
+            <a:r>
+              <a:rPr lang="en-US" dirty="0"/>
+              <a:t> = $</a:t>
+            </a:r>
+            <a:r>
+              <a:rPr lang="en-US" dirty="0" err="1"/>
+              <a:t>event.target.checked</a:t>
+            </a:r>
+            <a:r>
+              <a:rPr lang="en-US" dirty="0"/>
+              <a:t>;</a:t>
+            </a:r>
+          </a:p>
+          <a:p>
+            <a:pPr marL="0" indent="0">
+              <a:buNone/>
+            </a:pPr>
+            <a:r>
+              <a:rPr lang="en-US" dirty="0"/>
+              <a:t>    </a:t>
+            </a:r>
+            <a:r>
+              <a:rPr lang="en-US" dirty="0" err="1"/>
+              <a:t>var</a:t>
+            </a:r>
+            <a:r>
+              <a:rPr lang="en-US" dirty="0"/>
+              <a:t> _t = $</a:t>
+            </a:r>
+            <a:r>
+              <a:rPr lang="en-US" dirty="0" err="1"/>
+              <a:t>scope.todos</a:t>
+            </a:r>
+            <a:r>
+              <a:rPr lang="en-US" dirty="0"/>
+              <a:t>[</a:t>
+            </a:r>
+            <a:r>
+              <a:rPr lang="en-US" dirty="0" err="1"/>
+              <a:t>i</a:t>
+            </a:r>
+            <a:r>
+              <a:rPr lang="en-US" dirty="0"/>
+              <a:t>];</a:t>
+            </a:r>
+          </a:p>
+          <a:p>
+            <a:pPr marL="0" indent="0">
+              <a:buNone/>
+            </a:pPr>
+            <a:r>
+              <a:rPr lang="en-US" dirty="0"/>
+              <a:t>    </a:t>
+            </a:r>
+            <a:r>
+              <a:rPr lang="en-US" dirty="0" err="1"/>
+              <a:t>todosFactory.updateTodo</a:t>
+            </a:r>
+            <a:r>
+              <a:rPr lang="en-US" dirty="0"/>
+              <a:t>({</a:t>
+            </a:r>
+          </a:p>
+          <a:p>
+            <a:pPr marL="0" indent="0">
+              <a:buNone/>
+            </a:pPr>
+            <a:r>
+              <a:rPr lang="en-US" b="1" dirty="0"/>
+              <a:t>      _id: _id,</a:t>
+            </a:r>
+          </a:p>
+          <a:p>
+            <a:pPr marL="0" indent="0">
+              <a:buNone/>
+            </a:pPr>
+            <a:r>
+              <a:rPr lang="en-US" b="1" dirty="0"/>
+              <a:t>      </a:t>
+            </a:r>
+            <a:r>
+              <a:rPr lang="en-US" b="1" dirty="0" err="1"/>
+              <a:t>isCompleted</a:t>
+            </a:r>
+            <a:r>
+              <a:rPr lang="en-US" b="1" dirty="0" smtClean="0"/>
+              <a:t>: </a:t>
+            </a:r>
+            <a:r>
+              <a:rPr lang="en-US" b="1" dirty="0" err="1" smtClean="0"/>
+              <a:t>cbk</a:t>
+            </a:r>
+            <a:r>
+              <a:rPr lang="en-US" b="1" dirty="0" smtClean="0"/>
+              <a:t>,</a:t>
+            </a:r>
+          </a:p>
+          <a:p>
+            <a:pPr marL="0" indent="0">
+              <a:buNone/>
+            </a:pPr>
+            <a:r>
+              <a:rPr lang="en-US" b="1" dirty="0" smtClean="0"/>
+              <a:t>      </a:t>
+            </a:r>
+            <a:r>
+              <a:rPr lang="en-US" b="1" dirty="0" err="1" smtClean="0"/>
+              <a:t>todo</a:t>
+            </a:r>
+            <a:r>
+              <a:rPr lang="en-US" b="1" dirty="0" smtClean="0"/>
+              <a:t>: _</a:t>
+            </a:r>
+            <a:r>
+              <a:rPr lang="en-US" b="1" dirty="0" err="1" smtClean="0"/>
+              <a:t>t.todo</a:t>
+            </a:r>
+            <a:endParaRPr lang="en-US" b="1" dirty="0" smtClean="0"/>
+          </a:p>
+          <a:p>
+            <a:pPr marL="0" indent="0">
+              <a:buNone/>
+            </a:pPr>
             <a:r>
               <a:rPr lang="en-US" dirty="0" smtClean="0"/>
-              <a:t>MongoDB</a:t>
-            </a:r>
-          </a:p>
-          <a:p>
-            <a:r>
-              <a:rPr lang="en-US" dirty="0" smtClean="0"/>
-              <a:t>Express</a:t>
-            </a:r>
-          </a:p>
-          <a:p>
-            <a:r>
-              <a:rPr lang="en-US" dirty="0" smtClean="0"/>
-              <a:t>Angular</a:t>
-            </a:r>
-          </a:p>
-          <a:p>
-            <a:r>
-              <a:rPr lang="en-US" dirty="0" smtClean="0"/>
-              <a:t>Node</a:t>
-            </a:r>
-            <a:endParaRPr lang="en-US" dirty="0"/>
+              <a:t>    </a:t>
+            </a:r>
+            <a:r>
+              <a:rPr lang="en-US" dirty="0"/>
+              <a:t>}).then(function(data) {</a:t>
+            </a:r>
+          </a:p>
+          <a:p>
+            <a:pPr marL="0" indent="0">
+              <a:buNone/>
+            </a:pPr>
+            <a:r>
+              <a:rPr lang="en-US" dirty="0"/>
+              <a:t>      if (</a:t>
+            </a:r>
+            <a:r>
+              <a:rPr lang="en-US" dirty="0" err="1"/>
+              <a:t>data.data.ok</a:t>
+            </a:r>
+            <a:r>
+              <a:rPr lang="en-US" dirty="0"/>
+              <a:t>) {</a:t>
+            </a:r>
+          </a:p>
+          <a:p>
+            <a:pPr marL="0" indent="0">
+              <a:buNone/>
+            </a:pPr>
+            <a:r>
+              <a:rPr lang="en-US" dirty="0"/>
+              <a:t>        _</a:t>
+            </a:r>
+            <a:r>
+              <a:rPr lang="en-US" dirty="0" err="1"/>
+              <a:t>t.isCompleted</a:t>
+            </a:r>
+            <a:r>
+              <a:rPr lang="en-US" dirty="0"/>
+              <a:t> = </a:t>
+            </a:r>
+            <a:r>
+              <a:rPr lang="en-US" dirty="0" err="1"/>
+              <a:t>cbk</a:t>
+            </a:r>
+            <a:r>
+              <a:rPr lang="en-US" dirty="0"/>
+              <a:t>;</a:t>
+            </a:r>
+          </a:p>
+          <a:p>
+            <a:pPr marL="0" indent="0">
+              <a:buNone/>
+            </a:pPr>
+            <a:r>
+              <a:rPr lang="en-US" dirty="0"/>
+              <a:t>      } else {</a:t>
+            </a:r>
+          </a:p>
+          <a:p>
+            <a:pPr marL="0" indent="0">
+              <a:buNone/>
+            </a:pPr>
+            <a:r>
+              <a:rPr lang="en-US" dirty="0"/>
+              <a:t>        alert('Oops something went wrong!');</a:t>
+            </a:r>
+          </a:p>
+          <a:p>
+            <a:pPr marL="0" indent="0">
+              <a:buNone/>
+            </a:pPr>
+            <a:r>
+              <a:rPr lang="en-US" dirty="0"/>
+              <a:t>      }</a:t>
+            </a:r>
+          </a:p>
+          <a:p>
+            <a:pPr marL="0" indent="0">
+              <a:buNone/>
+            </a:pPr>
+            <a:r>
+              <a:rPr lang="en-US" dirty="0"/>
+              <a:t>    });</a:t>
+            </a:r>
+          </a:p>
+          <a:p>
+            <a:pPr marL="0" indent="0">
+              <a:buNone/>
+            </a:pPr>
+            <a:r>
+              <a:rPr lang="en-US" dirty="0"/>
+              <a:t>  };</a:t>
+            </a:r>
           </a:p>
         </p:txBody>
       </p:sp>
@@ -10699,6 +11884,534 @@
     <p:extLst>
       <p:ext uri="{BB962C8B-B14F-4D97-AF65-F5344CB8AC3E}">
         <p14:creationId xmlns:p14="http://schemas.microsoft.com/office/powerpoint/2010/main" val="2445364700"/>
+      </p:ext>
+    </p:extLst>
+  </p:cSld>
+  <p:clrMapOvr>
+    <a:masterClrMapping/>
+  </p:clrMapOvr>
+</p:sld>
+</file>
+
+<file path=ppt/slides/slide28.xml><?xml version="1.0" encoding="utf-8"?>
+<p:sld xmlns:a="http://schemas.openxmlformats.org/drawingml/2006/main" xmlns:r="http://schemas.openxmlformats.org/officeDocument/2006/relationships" xmlns:p="http://schemas.openxmlformats.org/presentationml/2006/main">
+  <p:cSld>
+    <p:spTree>
+      <p:nvGrpSpPr>
+        <p:cNvPr id="1" name=""/>
+        <p:cNvGrpSpPr/>
+        <p:nvPr/>
+      </p:nvGrpSpPr>
+      <p:grpSpPr>
+        <a:xfrm>
+          <a:off x="0" y="0"/>
+          <a:ext cx="0" cy="0"/>
+          <a:chOff x="0" y="0"/>
+          <a:chExt cx="0" cy="0"/>
+        </a:xfrm>
+      </p:grpSpPr>
+      <p:sp>
+        <p:nvSpPr>
+          <p:cNvPr id="2" name="Title 1"/>
+          <p:cNvSpPr>
+            <a:spLocks noGrp="1"/>
+          </p:cNvSpPr>
+          <p:nvPr>
+            <p:ph type="title"/>
+          </p:nvPr>
+        </p:nvSpPr>
+        <p:spPr/>
+        <p:txBody>
+          <a:bodyPr/>
+          <a:lstStyle/>
+          <a:p>
+            <a:r>
+              <a:rPr lang="en-US" dirty="0" smtClean="0"/>
+              <a:t>Express Server</a:t>
+            </a:r>
+            <a:endParaRPr lang="en-US" dirty="0"/>
+          </a:p>
+        </p:txBody>
+      </p:sp>
+      <p:sp>
+        <p:nvSpPr>
+          <p:cNvPr id="3" name="Content Placeholder 2"/>
+          <p:cNvSpPr>
+            <a:spLocks noGrp="1"/>
+          </p:cNvSpPr>
+          <p:nvPr>
+            <p:ph idx="1"/>
+          </p:nvPr>
+        </p:nvSpPr>
+        <p:spPr/>
+        <p:txBody>
+          <a:bodyPr>
+            <a:normAutofit fontScale="85000" lnSpcReduction="20000"/>
+          </a:bodyPr>
+          <a:lstStyle/>
+          <a:p>
+            <a:pPr marL="0" indent="0">
+              <a:buNone/>
+            </a:pPr>
+            <a:r>
+              <a:rPr lang="en-US" dirty="0"/>
+              <a:t> </a:t>
+            </a:r>
+            <a:r>
+              <a:rPr lang="en-US" dirty="0" err="1"/>
+              <a:t>router.put</a:t>
+            </a:r>
+            <a:r>
+              <a:rPr lang="en-US" dirty="0"/>
+              <a:t>('/</a:t>
+            </a:r>
+            <a:r>
+              <a:rPr lang="en-US" dirty="0" err="1"/>
+              <a:t>api</a:t>
+            </a:r>
+            <a:r>
+              <a:rPr lang="en-US" dirty="0"/>
+              <a:t>/</a:t>
+            </a:r>
+            <a:r>
+              <a:rPr lang="en-US" dirty="0" err="1"/>
+              <a:t>todos</a:t>
+            </a:r>
+            <a:r>
+              <a:rPr lang="en-US" dirty="0"/>
+              <a:t>', function(</a:t>
+            </a:r>
+            <a:r>
+              <a:rPr lang="en-US" dirty="0" err="1"/>
+              <a:t>req</a:t>
+            </a:r>
+            <a:r>
+              <a:rPr lang="en-US" dirty="0"/>
+              <a:t>, res) {</a:t>
+            </a:r>
+          </a:p>
+          <a:p>
+            <a:pPr marL="0" indent="0">
+              <a:buNone/>
+            </a:pPr>
+            <a:r>
+              <a:rPr lang="en-US" dirty="0"/>
+              <a:t>    </a:t>
+            </a:r>
+            <a:r>
+              <a:rPr lang="en-US" dirty="0" err="1"/>
+              <a:t>var</a:t>
+            </a:r>
+            <a:r>
+              <a:rPr lang="en-US" dirty="0"/>
+              <a:t> id = </a:t>
+            </a:r>
+            <a:r>
+              <a:rPr lang="en-US" dirty="0" err="1"/>
+              <a:t>req.body._id</a:t>
+            </a:r>
+            <a:r>
+              <a:rPr lang="en-US" dirty="0"/>
+              <a:t>;</a:t>
+            </a:r>
+          </a:p>
+          <a:p>
+            <a:pPr marL="0" indent="0">
+              <a:buNone/>
+            </a:pPr>
+            <a:r>
+              <a:rPr lang="en-US" dirty="0"/>
+              <a:t>    delete </a:t>
+            </a:r>
+            <a:r>
+              <a:rPr lang="en-US" dirty="0" err="1"/>
+              <a:t>req.body</a:t>
+            </a:r>
+            <a:r>
+              <a:rPr lang="en-US" dirty="0"/>
+              <a:t>["_id"];</a:t>
+            </a:r>
+          </a:p>
+          <a:p>
+            <a:pPr marL="0" indent="0">
+              <a:buNone/>
+            </a:pPr>
+            <a:r>
+              <a:rPr lang="en-US" dirty="0"/>
+              <a:t>    </a:t>
+            </a:r>
+            <a:r>
+              <a:rPr lang="en-US" dirty="0" err="1"/>
+              <a:t>db.todos.update</a:t>
+            </a:r>
+            <a:r>
+              <a:rPr lang="en-US" dirty="0"/>
+              <a:t>({</a:t>
+            </a:r>
+          </a:p>
+          <a:p>
+            <a:pPr marL="0" indent="0">
+              <a:buNone/>
+            </a:pPr>
+            <a:r>
+              <a:rPr lang="en-US" dirty="0"/>
+              <a:t>      _id: </a:t>
+            </a:r>
+            <a:r>
+              <a:rPr lang="en-US" dirty="0" err="1"/>
+              <a:t>mongojs.ObjectId</a:t>
+            </a:r>
+            <a:r>
+              <a:rPr lang="en-US" dirty="0"/>
+              <a:t>(id)</a:t>
+            </a:r>
+          </a:p>
+          <a:p>
+            <a:pPr marL="0" indent="0">
+              <a:buNone/>
+            </a:pPr>
+            <a:r>
+              <a:rPr lang="en-US" dirty="0"/>
+              <a:t>    }, </a:t>
+            </a:r>
+            <a:r>
+              <a:rPr lang="en-US" dirty="0" err="1"/>
+              <a:t>req.body</a:t>
+            </a:r>
+            <a:r>
+              <a:rPr lang="en-US" dirty="0"/>
+              <a:t>, {}, function(err, data) </a:t>
+            </a:r>
+            <a:r>
+              <a:rPr lang="en-US" dirty="0" smtClean="0"/>
+              <a:t>{</a:t>
+            </a:r>
+            <a:endParaRPr lang="en-US" dirty="0"/>
+          </a:p>
+          <a:p>
+            <a:pPr marL="0" indent="0">
+              <a:buNone/>
+            </a:pPr>
+            <a:r>
+              <a:rPr lang="en-US" dirty="0"/>
+              <a:t>      </a:t>
+            </a:r>
+            <a:r>
+              <a:rPr lang="en-US" dirty="0" err="1"/>
+              <a:t>res.json</a:t>
+            </a:r>
+            <a:r>
+              <a:rPr lang="en-US" dirty="0"/>
+              <a:t>(data);</a:t>
+            </a:r>
+          </a:p>
+          <a:p>
+            <a:pPr marL="0" indent="0">
+              <a:buNone/>
+            </a:pPr>
+            <a:r>
+              <a:rPr lang="en-US" dirty="0"/>
+              <a:t>      </a:t>
+            </a:r>
+            <a:r>
+              <a:rPr lang="en-US" dirty="0" err="1"/>
+              <a:t>req.body</a:t>
+            </a:r>
+            <a:r>
+              <a:rPr lang="en-US" dirty="0"/>
+              <a:t>["_id"] = id;</a:t>
+            </a:r>
+          </a:p>
+          <a:p>
+            <a:pPr marL="0" indent="0">
+              <a:buNone/>
+            </a:pPr>
+            <a:r>
+              <a:rPr lang="en-US" dirty="0"/>
+              <a:t>    });</a:t>
+            </a:r>
+          </a:p>
+          <a:p>
+            <a:pPr marL="0" indent="0">
+              <a:buNone/>
+            </a:pPr>
+            <a:r>
+              <a:rPr lang="en-US" dirty="0"/>
+              <a:t>  });</a:t>
+            </a:r>
+          </a:p>
+        </p:txBody>
+      </p:sp>
+    </p:spTree>
+    <p:extLst>
+      <p:ext uri="{BB962C8B-B14F-4D97-AF65-F5344CB8AC3E}">
+        <p14:creationId xmlns:p14="http://schemas.microsoft.com/office/powerpoint/2010/main" val="691868760"/>
+      </p:ext>
+    </p:extLst>
+  </p:cSld>
+  <p:clrMapOvr>
+    <a:masterClrMapping/>
+  </p:clrMapOvr>
+</p:sld>
+</file>
+
+<file path=ppt/slides/slide29.xml><?xml version="1.0" encoding="utf-8"?>
+<p:sld xmlns:a="http://schemas.openxmlformats.org/drawingml/2006/main" xmlns:r="http://schemas.openxmlformats.org/officeDocument/2006/relationships" xmlns:p="http://schemas.openxmlformats.org/presentationml/2006/main">
+  <p:cSld>
+    <p:spTree>
+      <p:nvGrpSpPr>
+        <p:cNvPr id="1" name=""/>
+        <p:cNvGrpSpPr/>
+        <p:nvPr/>
+      </p:nvGrpSpPr>
+      <p:grpSpPr>
+        <a:xfrm>
+          <a:off x="0" y="0"/>
+          <a:ext cx="0" cy="0"/>
+          <a:chOff x="0" y="0"/>
+          <a:chExt cx="0" cy="0"/>
+        </a:xfrm>
+      </p:grpSpPr>
+      <p:sp>
+        <p:nvSpPr>
+          <p:cNvPr id="2" name="Title 1"/>
+          <p:cNvSpPr>
+            <a:spLocks noGrp="1"/>
+          </p:cNvSpPr>
+          <p:nvPr>
+            <p:ph type="title"/>
+          </p:nvPr>
+        </p:nvSpPr>
+        <p:spPr/>
+        <p:txBody>
+          <a:bodyPr/>
+          <a:lstStyle/>
+          <a:p>
+            <a:r>
+              <a:rPr lang="en-US" dirty="0" smtClean="0"/>
+              <a:t>Express Server</a:t>
+            </a:r>
+            <a:endParaRPr lang="en-US" dirty="0"/>
+          </a:p>
+        </p:txBody>
+      </p:sp>
+      <p:sp>
+        <p:nvSpPr>
+          <p:cNvPr id="3" name="Content Placeholder 2"/>
+          <p:cNvSpPr>
+            <a:spLocks noGrp="1"/>
+          </p:cNvSpPr>
+          <p:nvPr>
+            <p:ph idx="1"/>
+          </p:nvPr>
+        </p:nvSpPr>
+        <p:spPr/>
+        <p:txBody>
+          <a:bodyPr>
+            <a:normAutofit fontScale="85000" lnSpcReduction="20000"/>
+          </a:bodyPr>
+          <a:lstStyle/>
+          <a:p>
+            <a:pPr marL="0" indent="0">
+              <a:buNone/>
+            </a:pPr>
+            <a:r>
+              <a:rPr lang="en-US" dirty="0"/>
+              <a:t> </a:t>
+            </a:r>
+            <a:r>
+              <a:rPr lang="en-US" dirty="0" err="1"/>
+              <a:t>router.put</a:t>
+            </a:r>
+            <a:r>
+              <a:rPr lang="en-US" dirty="0"/>
+              <a:t>('/</a:t>
+            </a:r>
+            <a:r>
+              <a:rPr lang="en-US" dirty="0" err="1"/>
+              <a:t>api</a:t>
+            </a:r>
+            <a:r>
+              <a:rPr lang="en-US" dirty="0"/>
+              <a:t>/</a:t>
+            </a:r>
+            <a:r>
+              <a:rPr lang="en-US" dirty="0" err="1"/>
+              <a:t>todos</a:t>
+            </a:r>
+            <a:r>
+              <a:rPr lang="en-US" dirty="0"/>
+              <a:t>', function(</a:t>
+            </a:r>
+            <a:r>
+              <a:rPr lang="en-US" dirty="0" err="1"/>
+              <a:t>req</a:t>
+            </a:r>
+            <a:r>
+              <a:rPr lang="en-US" dirty="0"/>
+              <a:t>, res) {</a:t>
+            </a:r>
+          </a:p>
+          <a:p>
+            <a:pPr marL="0" indent="0">
+              <a:buNone/>
+            </a:pPr>
+            <a:r>
+              <a:rPr lang="en-US" dirty="0"/>
+              <a:t>    </a:t>
+            </a:r>
+            <a:r>
+              <a:rPr lang="en-US" dirty="0" err="1"/>
+              <a:t>var</a:t>
+            </a:r>
+            <a:r>
+              <a:rPr lang="en-US" dirty="0"/>
+              <a:t> id = </a:t>
+            </a:r>
+            <a:r>
+              <a:rPr lang="en-US" dirty="0" err="1"/>
+              <a:t>req.body._id</a:t>
+            </a:r>
+            <a:r>
+              <a:rPr lang="en-US" dirty="0"/>
+              <a:t>;</a:t>
+            </a:r>
+          </a:p>
+          <a:p>
+            <a:pPr marL="0" indent="0">
+              <a:buNone/>
+            </a:pPr>
+            <a:r>
+              <a:rPr lang="en-US" dirty="0"/>
+              <a:t>    </a:t>
+            </a:r>
+            <a:r>
+              <a:rPr lang="en-US" b="1" dirty="0"/>
+              <a:t>delete </a:t>
+            </a:r>
+            <a:r>
+              <a:rPr lang="en-US" b="1" dirty="0" err="1"/>
+              <a:t>req.body</a:t>
+            </a:r>
+            <a:r>
+              <a:rPr lang="en-US" b="1" dirty="0"/>
+              <a:t>["_id"];</a:t>
+            </a:r>
+          </a:p>
+          <a:p>
+            <a:pPr marL="0" indent="0">
+              <a:buNone/>
+            </a:pPr>
+            <a:r>
+              <a:rPr lang="en-US" dirty="0"/>
+              <a:t>    </a:t>
+            </a:r>
+            <a:r>
+              <a:rPr lang="en-US" dirty="0" err="1"/>
+              <a:t>db.todos.update</a:t>
+            </a:r>
+            <a:r>
+              <a:rPr lang="en-US" dirty="0"/>
+              <a:t>({</a:t>
+            </a:r>
+          </a:p>
+          <a:p>
+            <a:pPr marL="0" indent="0">
+              <a:buNone/>
+            </a:pPr>
+            <a:r>
+              <a:rPr lang="en-US" dirty="0"/>
+              <a:t>      _id: </a:t>
+            </a:r>
+            <a:r>
+              <a:rPr lang="en-US" dirty="0" err="1"/>
+              <a:t>mongojs.ObjectId</a:t>
+            </a:r>
+            <a:r>
+              <a:rPr lang="en-US" dirty="0"/>
+              <a:t>(id)</a:t>
+            </a:r>
+          </a:p>
+          <a:p>
+            <a:pPr marL="0" indent="0">
+              <a:buNone/>
+            </a:pPr>
+            <a:r>
+              <a:rPr lang="en-US" dirty="0"/>
+              <a:t>    }, </a:t>
+            </a:r>
+            <a:r>
+              <a:rPr lang="en-US" dirty="0" err="1"/>
+              <a:t>req.body</a:t>
+            </a:r>
+            <a:r>
+              <a:rPr lang="en-US" dirty="0"/>
+              <a:t>, {}, function(err, data) </a:t>
+            </a:r>
+            <a:r>
+              <a:rPr lang="en-US" dirty="0" smtClean="0"/>
+              <a:t>{</a:t>
+            </a:r>
+            <a:endParaRPr lang="en-US" dirty="0"/>
+          </a:p>
+          <a:p>
+            <a:pPr marL="0" indent="0">
+              <a:buNone/>
+            </a:pPr>
+            <a:r>
+              <a:rPr lang="en-US" dirty="0"/>
+              <a:t>      </a:t>
+            </a:r>
+            <a:r>
+              <a:rPr lang="en-US" dirty="0" err="1"/>
+              <a:t>res.json</a:t>
+            </a:r>
+            <a:r>
+              <a:rPr lang="en-US" dirty="0"/>
+              <a:t>(data);</a:t>
+            </a:r>
+          </a:p>
+          <a:p>
+            <a:pPr marL="0" indent="0">
+              <a:buNone/>
+            </a:pPr>
+            <a:r>
+              <a:rPr lang="en-US" dirty="0"/>
+              <a:t>      </a:t>
+            </a:r>
+            <a:r>
+              <a:rPr lang="en-US" b="1" dirty="0" err="1"/>
+              <a:t>req.body</a:t>
+            </a:r>
+            <a:r>
+              <a:rPr lang="en-US" b="1" dirty="0"/>
+              <a:t>["_id"] = id;</a:t>
+            </a:r>
+          </a:p>
+          <a:p>
+            <a:pPr marL="0" indent="0">
+              <a:buNone/>
+            </a:pPr>
+            <a:r>
+              <a:rPr lang="en-US" dirty="0"/>
+              <a:t>    });</a:t>
+            </a:r>
+          </a:p>
+          <a:p>
+            <a:pPr marL="0" indent="0">
+              <a:buNone/>
+            </a:pPr>
+            <a:r>
+              <a:rPr lang="en-US" dirty="0"/>
+              <a:t>  });</a:t>
+            </a:r>
+          </a:p>
+        </p:txBody>
+      </p:sp>
+    </p:spTree>
+    <p:extLst>
+      <p:ext uri="{BB962C8B-B14F-4D97-AF65-F5344CB8AC3E}">
+        <p14:creationId xmlns:p14="http://schemas.microsoft.com/office/powerpoint/2010/main" val="2913776688"/>
       </p:ext>
     </p:extLst>
   </p:cSld>
@@ -10742,7 +12455,7 @@
           <a:p>
             <a:r>
               <a:rPr lang="en-US" b="1" dirty="0" smtClean="0"/>
-              <a:t>MongoDB Stores Documents</a:t>
+              <a:t>Stores BSON Documents</a:t>
             </a:r>
             <a:endParaRPr lang="en-US" b="1" dirty="0"/>
           </a:p>
@@ -10953,6 +12666,640 @@
 </p:sld>
 </file>
 
+<file path=ppt/slides/slide30.xml><?xml version="1.0" encoding="utf-8"?>
+<p:sld xmlns:a="http://schemas.openxmlformats.org/drawingml/2006/main" xmlns:r="http://schemas.openxmlformats.org/officeDocument/2006/relationships" xmlns:p="http://schemas.openxmlformats.org/presentationml/2006/main">
+  <p:cSld>
+    <p:spTree>
+      <p:nvGrpSpPr>
+        <p:cNvPr id="1" name=""/>
+        <p:cNvGrpSpPr/>
+        <p:nvPr/>
+      </p:nvGrpSpPr>
+      <p:grpSpPr>
+        <a:xfrm>
+          <a:off x="0" y="0"/>
+          <a:ext cx="0" cy="0"/>
+          <a:chOff x="0" y="0"/>
+          <a:chExt cx="0" cy="0"/>
+        </a:xfrm>
+      </p:grpSpPr>
+      <p:sp>
+        <p:nvSpPr>
+          <p:cNvPr id="2" name="Title 1"/>
+          <p:cNvSpPr>
+            <a:spLocks noGrp="1"/>
+          </p:cNvSpPr>
+          <p:nvPr>
+            <p:ph type="title"/>
+          </p:nvPr>
+        </p:nvSpPr>
+        <p:spPr/>
+        <p:txBody>
+          <a:bodyPr/>
+          <a:lstStyle/>
+          <a:p>
+            <a:r>
+              <a:rPr lang="en-US" dirty="0" smtClean="0"/>
+              <a:t>Angular view</a:t>
+            </a:r>
+            <a:endParaRPr lang="en-US" dirty="0"/>
+          </a:p>
+        </p:txBody>
+      </p:sp>
+      <p:sp>
+        <p:nvSpPr>
+          <p:cNvPr id="3" name="Content Placeholder 2"/>
+          <p:cNvSpPr>
+            <a:spLocks noGrp="1"/>
+          </p:cNvSpPr>
+          <p:nvPr>
+            <p:ph idx="1"/>
+          </p:nvPr>
+        </p:nvSpPr>
+        <p:spPr/>
+        <p:txBody>
+          <a:bodyPr>
+            <a:normAutofit/>
+          </a:bodyPr>
+          <a:lstStyle/>
+          <a:p>
+            <a:pPr marL="0" indent="0">
+              <a:buNone/>
+            </a:pPr>
+            <a:r>
+              <a:rPr lang="en-US" dirty="0"/>
+              <a:t> </a:t>
+            </a:r>
+            <a:r>
+              <a:rPr lang="en-US" sz="2800" dirty="0"/>
+              <a:t>&lt;div class="col-md-1 col-sm-1 col-xs-1"&gt;</a:t>
+            </a:r>
+          </a:p>
+          <a:p>
+            <a:pPr marL="0" indent="0">
+              <a:buNone/>
+            </a:pPr>
+            <a:r>
+              <a:rPr lang="en-US" sz="2800" dirty="0"/>
+              <a:t>    </a:t>
+            </a:r>
+            <a:r>
+              <a:rPr lang="en-US" sz="2800" dirty="0" smtClean="0"/>
+              <a:t>&lt;</a:t>
+            </a:r>
+            <a:r>
+              <a:rPr lang="en-US" sz="2800" dirty="0"/>
+              <a:t>span </a:t>
+            </a:r>
+            <a:r>
+              <a:rPr lang="en-US" sz="2800" dirty="0" err="1"/>
+              <a:t>ng</a:t>
+            </a:r>
+            <a:r>
+              <a:rPr lang="en-US" sz="2800" dirty="0"/>
+              <a:t>-class="{'</a:t>
+            </a:r>
+            <a:r>
+              <a:rPr lang="en-US" sz="2800" dirty="0" err="1"/>
+              <a:t>glyphicon</a:t>
+            </a:r>
+            <a:r>
+              <a:rPr lang="en-US" sz="2800" dirty="0"/>
+              <a:t> </a:t>
+            </a:r>
+            <a:r>
+              <a:rPr lang="en-US" sz="2800" dirty="0" err="1"/>
+              <a:t>glyphicon</a:t>
+            </a:r>
+            <a:r>
+              <a:rPr lang="en-US" sz="2800" dirty="0"/>
+              <a:t>-star': </a:t>
+            </a:r>
+            <a:r>
+              <a:rPr lang="en-US" sz="2800" dirty="0" smtClean="0"/>
+              <a:t>  </a:t>
+            </a:r>
+          </a:p>
+          <a:p>
+            <a:pPr marL="0" indent="0">
+              <a:buNone/>
+            </a:pPr>
+            <a:r>
+              <a:rPr lang="en-US" sz="2800" dirty="0"/>
+              <a:t> </a:t>
+            </a:r>
+            <a:r>
+              <a:rPr lang="en-US" sz="2800" dirty="0" smtClean="0"/>
+              <a:t>                                       </a:t>
+            </a:r>
+            <a:r>
+              <a:rPr lang="en-US" sz="2800" dirty="0" err="1" smtClean="0"/>
+              <a:t>todo.highPriority</a:t>
+            </a:r>
+            <a:r>
+              <a:rPr lang="en-US" sz="2800" dirty="0" smtClean="0"/>
+              <a:t>,</a:t>
+            </a:r>
+          </a:p>
+          <a:p>
+            <a:pPr marL="0" indent="0">
+              <a:buNone/>
+            </a:pPr>
+            <a:r>
+              <a:rPr lang="en-US" sz="2800" dirty="0"/>
+              <a:t> </a:t>
+            </a:r>
+            <a:r>
+              <a:rPr lang="en-US" sz="2800" dirty="0" smtClean="0"/>
+              <a:t>                                  </a:t>
+            </a:r>
+            <a:r>
+              <a:rPr lang="en-US" sz="2800" dirty="0"/>
+              <a:t>'</a:t>
+            </a:r>
+            <a:r>
+              <a:rPr lang="en-US" sz="2800" dirty="0" err="1"/>
+              <a:t>glyphicon</a:t>
+            </a:r>
+            <a:r>
+              <a:rPr lang="en-US" sz="2800" dirty="0"/>
+              <a:t> </a:t>
+            </a:r>
+            <a:r>
+              <a:rPr lang="en-US" sz="2800" dirty="0" err="1"/>
+              <a:t>glyphicon</a:t>
+            </a:r>
+            <a:r>
+              <a:rPr lang="en-US" sz="2800" dirty="0"/>
+              <a:t>-star-empty': </a:t>
+            </a:r>
+            <a:endParaRPr lang="en-US" sz="2800" dirty="0" smtClean="0"/>
+          </a:p>
+          <a:p>
+            <a:pPr marL="0" indent="0">
+              <a:buNone/>
+            </a:pPr>
+            <a:r>
+              <a:rPr lang="en-US" sz="2800" dirty="0"/>
+              <a:t> </a:t>
+            </a:r>
+            <a:r>
+              <a:rPr lang="en-US" sz="2800" dirty="0" smtClean="0"/>
+              <a:t>                                      !</a:t>
+            </a:r>
+            <a:r>
+              <a:rPr lang="en-US" sz="2800" dirty="0" err="1"/>
+              <a:t>todo.highPriority</a:t>
+            </a:r>
+            <a:r>
+              <a:rPr lang="en-US" sz="2800" dirty="0" smtClean="0"/>
+              <a:t>}” </a:t>
+            </a:r>
+            <a:endParaRPr lang="en-US" sz="2800" dirty="0"/>
+          </a:p>
+          <a:p>
+            <a:pPr marL="0" indent="0">
+              <a:buNone/>
+            </a:pPr>
+            <a:r>
+              <a:rPr lang="en-US" sz="2800" dirty="0" smtClean="0"/>
+              <a:t>    </a:t>
+            </a:r>
+            <a:r>
+              <a:rPr lang="en-US" sz="2800" dirty="0"/>
+              <a:t> </a:t>
+            </a:r>
+            <a:r>
+              <a:rPr lang="en-US" sz="2800" dirty="0" err="1" smtClean="0"/>
+              <a:t>ng</a:t>
+            </a:r>
+            <a:r>
+              <a:rPr lang="en-US" sz="2800" dirty="0"/>
+              <a:t>-click="</a:t>
+            </a:r>
+            <a:r>
+              <a:rPr lang="en-US" sz="2800" dirty="0" err="1"/>
+              <a:t>updatePriority</a:t>
+            </a:r>
+            <a:r>
+              <a:rPr lang="en-US" sz="2800" dirty="0"/>
+              <a:t>($event, </a:t>
+            </a:r>
+            <a:r>
+              <a:rPr lang="en-US" sz="2800" dirty="0" err="1"/>
+              <a:t>todo</a:t>
+            </a:r>
+            <a:r>
+              <a:rPr lang="en-US" sz="2800" dirty="0"/>
+              <a:t>._id, $index)"</a:t>
+            </a:r>
+            <a:r>
+              <a:rPr lang="en-US" sz="2800" dirty="0" smtClean="0"/>
+              <a:t>&gt;</a:t>
+            </a:r>
+          </a:p>
+          <a:p>
+            <a:pPr marL="0" indent="0">
+              <a:buNone/>
+            </a:pPr>
+            <a:r>
+              <a:rPr lang="en-US" sz="2800" dirty="0"/>
+              <a:t> </a:t>
+            </a:r>
+            <a:r>
+              <a:rPr lang="en-US" sz="2800" dirty="0" smtClean="0"/>
+              <a:t>  &lt;</a:t>
+            </a:r>
+            <a:r>
+              <a:rPr lang="en-US" sz="2800" dirty="0"/>
+              <a:t>/</a:t>
+            </a:r>
+            <a:r>
+              <a:rPr lang="en-US" sz="2800" dirty="0" smtClean="0"/>
+              <a:t>span&gt;</a:t>
+            </a:r>
+          </a:p>
+          <a:p>
+            <a:pPr marL="0" indent="0">
+              <a:buNone/>
+            </a:pPr>
+            <a:r>
+              <a:rPr lang="en-US" sz="2800" dirty="0" smtClean="0"/>
+              <a:t>&lt;/div&gt;</a:t>
+            </a:r>
+            <a:endParaRPr lang="en-US" sz="2800" dirty="0"/>
+          </a:p>
+        </p:txBody>
+      </p:sp>
+    </p:spTree>
+    <p:extLst>
+      <p:ext uri="{BB962C8B-B14F-4D97-AF65-F5344CB8AC3E}">
+        <p14:creationId xmlns:p14="http://schemas.microsoft.com/office/powerpoint/2010/main" val="3701272946"/>
+      </p:ext>
+    </p:extLst>
+  </p:cSld>
+  <p:clrMapOvr>
+    <a:masterClrMapping/>
+  </p:clrMapOvr>
+</p:sld>
+</file>
+
+<file path=ppt/slides/slide31.xml><?xml version="1.0" encoding="utf-8"?>
+<p:sld xmlns:a="http://schemas.openxmlformats.org/drawingml/2006/main" xmlns:r="http://schemas.openxmlformats.org/officeDocument/2006/relationships" xmlns:p="http://schemas.openxmlformats.org/presentationml/2006/main">
+  <p:cSld>
+    <p:spTree>
+      <p:nvGrpSpPr>
+        <p:cNvPr id="1" name=""/>
+        <p:cNvGrpSpPr/>
+        <p:nvPr/>
+      </p:nvGrpSpPr>
+      <p:grpSpPr>
+        <a:xfrm>
+          <a:off x="0" y="0"/>
+          <a:ext cx="0" cy="0"/>
+          <a:chOff x="0" y="0"/>
+          <a:chExt cx="0" cy="0"/>
+        </a:xfrm>
+      </p:grpSpPr>
+      <p:sp>
+        <p:nvSpPr>
+          <p:cNvPr id="2" name="Title 1"/>
+          <p:cNvSpPr>
+            <a:spLocks noGrp="1"/>
+          </p:cNvSpPr>
+          <p:nvPr>
+            <p:ph type="title"/>
+          </p:nvPr>
+        </p:nvSpPr>
+        <p:spPr/>
+        <p:txBody>
+          <a:bodyPr/>
+          <a:lstStyle/>
+          <a:p>
+            <a:r>
+              <a:rPr lang="en-US" dirty="0" smtClean="0"/>
+              <a:t>Angular Controller</a:t>
+            </a:r>
+            <a:endParaRPr lang="en-US" dirty="0"/>
+          </a:p>
+        </p:txBody>
+      </p:sp>
+      <p:sp>
+        <p:nvSpPr>
+          <p:cNvPr id="3" name="Content Placeholder 2"/>
+          <p:cNvSpPr>
+            <a:spLocks noGrp="1"/>
+          </p:cNvSpPr>
+          <p:nvPr>
+            <p:ph idx="1"/>
+          </p:nvPr>
+        </p:nvSpPr>
+        <p:spPr/>
+        <p:txBody>
+          <a:bodyPr>
+            <a:normAutofit fontScale="55000" lnSpcReduction="20000"/>
+          </a:bodyPr>
+          <a:lstStyle/>
+          <a:p>
+            <a:pPr marL="0" indent="0">
+              <a:buNone/>
+            </a:pPr>
+            <a:r>
+              <a:rPr lang="en-US" dirty="0"/>
+              <a:t> $</a:t>
+            </a:r>
+            <a:r>
+              <a:rPr lang="en-US" dirty="0" err="1"/>
+              <a:t>scope.updateStatus</a:t>
+            </a:r>
+            <a:r>
+              <a:rPr lang="en-US" dirty="0"/>
+              <a:t> = function($event, _id, </a:t>
+            </a:r>
+            <a:r>
+              <a:rPr lang="en-US" dirty="0" err="1"/>
+              <a:t>i</a:t>
+            </a:r>
+            <a:r>
+              <a:rPr lang="en-US" dirty="0"/>
+              <a:t>) {</a:t>
+            </a:r>
+          </a:p>
+          <a:p>
+            <a:pPr marL="0" indent="0">
+              <a:buNone/>
+            </a:pPr>
+            <a:r>
+              <a:rPr lang="en-US" dirty="0"/>
+              <a:t>    </a:t>
+            </a:r>
+            <a:r>
+              <a:rPr lang="en-US" dirty="0" err="1"/>
+              <a:t>var</a:t>
+            </a:r>
+            <a:r>
+              <a:rPr lang="en-US" dirty="0"/>
+              <a:t> </a:t>
+            </a:r>
+            <a:r>
+              <a:rPr lang="en-US" dirty="0" err="1"/>
+              <a:t>cbk</a:t>
+            </a:r>
+            <a:r>
+              <a:rPr lang="en-US" dirty="0"/>
+              <a:t> = $</a:t>
+            </a:r>
+            <a:r>
+              <a:rPr lang="en-US" dirty="0" err="1"/>
+              <a:t>event.target.checked</a:t>
+            </a:r>
+            <a:r>
+              <a:rPr lang="en-US" dirty="0"/>
+              <a:t>;</a:t>
+            </a:r>
+          </a:p>
+          <a:p>
+            <a:pPr marL="0" indent="0">
+              <a:buNone/>
+            </a:pPr>
+            <a:r>
+              <a:rPr lang="en-US" dirty="0"/>
+              <a:t>    </a:t>
+            </a:r>
+            <a:r>
+              <a:rPr lang="en-US" dirty="0" err="1"/>
+              <a:t>var</a:t>
+            </a:r>
+            <a:r>
+              <a:rPr lang="en-US" dirty="0"/>
+              <a:t> _t = $</a:t>
+            </a:r>
+            <a:r>
+              <a:rPr lang="en-US" dirty="0" err="1"/>
+              <a:t>scope.todos</a:t>
+            </a:r>
+            <a:r>
+              <a:rPr lang="en-US" dirty="0"/>
+              <a:t>[</a:t>
+            </a:r>
+            <a:r>
+              <a:rPr lang="en-US" dirty="0" err="1"/>
+              <a:t>i</a:t>
+            </a:r>
+            <a:r>
+              <a:rPr lang="en-US" dirty="0"/>
+              <a:t>];</a:t>
+            </a:r>
+          </a:p>
+          <a:p>
+            <a:pPr marL="0" indent="0">
+              <a:buNone/>
+            </a:pPr>
+            <a:r>
+              <a:rPr lang="en-US" dirty="0"/>
+              <a:t>    </a:t>
+            </a:r>
+            <a:r>
+              <a:rPr lang="en-US" dirty="0" err="1"/>
+              <a:t>todosFactory.updateTodo</a:t>
+            </a:r>
+            <a:r>
+              <a:rPr lang="en-US" dirty="0"/>
+              <a:t>({</a:t>
+            </a:r>
+          </a:p>
+          <a:p>
+            <a:pPr marL="0" indent="0">
+              <a:buNone/>
+            </a:pPr>
+            <a:r>
+              <a:rPr lang="en-US" dirty="0"/>
+              <a:t>      _id: _id,</a:t>
+            </a:r>
+          </a:p>
+          <a:p>
+            <a:pPr marL="0" indent="0">
+              <a:buNone/>
+            </a:pPr>
+            <a:r>
+              <a:rPr lang="en-US" dirty="0"/>
+              <a:t>      </a:t>
+            </a:r>
+            <a:r>
+              <a:rPr lang="en-US" dirty="0" err="1"/>
+              <a:t>isCompleted</a:t>
+            </a:r>
+            <a:r>
+              <a:rPr lang="en-US" dirty="0"/>
+              <a:t>: </a:t>
+            </a:r>
+            <a:r>
+              <a:rPr lang="en-US" dirty="0" err="1"/>
+              <a:t>cbk</a:t>
+            </a:r>
+            <a:r>
+              <a:rPr lang="en-US" dirty="0"/>
+              <a:t>,</a:t>
+            </a:r>
+          </a:p>
+          <a:p>
+            <a:pPr marL="0" indent="0">
+              <a:buNone/>
+            </a:pPr>
+            <a:r>
+              <a:rPr lang="en-US" dirty="0"/>
+              <a:t>      </a:t>
+            </a:r>
+            <a:r>
+              <a:rPr lang="en-US" b="1" dirty="0" err="1"/>
+              <a:t>highPriority</a:t>
+            </a:r>
+            <a:r>
+              <a:rPr lang="en-US" b="1" dirty="0"/>
+              <a:t>: _</a:t>
+            </a:r>
+            <a:r>
+              <a:rPr lang="en-US" b="1" dirty="0" err="1"/>
+              <a:t>t.highPriority</a:t>
+            </a:r>
+            <a:r>
+              <a:rPr lang="en-US" b="1" dirty="0"/>
+              <a:t>,</a:t>
+            </a:r>
+          </a:p>
+          <a:p>
+            <a:pPr marL="0" indent="0">
+              <a:buNone/>
+            </a:pPr>
+            <a:r>
+              <a:rPr lang="en-US" dirty="0"/>
+              <a:t>      </a:t>
+            </a:r>
+            <a:r>
+              <a:rPr lang="en-US" dirty="0" err="1"/>
+              <a:t>todo</a:t>
+            </a:r>
+            <a:r>
+              <a:rPr lang="en-US" dirty="0"/>
+              <a:t>: _</a:t>
+            </a:r>
+            <a:r>
+              <a:rPr lang="en-US" dirty="0" err="1"/>
+              <a:t>t.todo</a:t>
+            </a:r>
+            <a:endParaRPr lang="en-US" dirty="0"/>
+          </a:p>
+          <a:p>
+            <a:pPr marL="0" indent="0">
+              <a:buNone/>
+            </a:pPr>
+            <a:r>
+              <a:rPr lang="en-US" dirty="0"/>
+              <a:t>    }).then(function(data) {</a:t>
+            </a:r>
+          </a:p>
+          <a:p>
+            <a:pPr marL="0" indent="0">
+              <a:buNone/>
+            </a:pPr>
+            <a:r>
+              <a:rPr lang="en-US" dirty="0"/>
+              <a:t>      if (</a:t>
+            </a:r>
+            <a:r>
+              <a:rPr lang="en-US" dirty="0" err="1"/>
+              <a:t>data.data.ok</a:t>
+            </a:r>
+            <a:r>
+              <a:rPr lang="en-US" dirty="0"/>
+              <a:t>) {</a:t>
+            </a:r>
+          </a:p>
+          <a:p>
+            <a:pPr marL="0" indent="0">
+              <a:buNone/>
+            </a:pPr>
+            <a:r>
+              <a:rPr lang="en-US" dirty="0"/>
+              <a:t>        _</a:t>
+            </a:r>
+            <a:r>
+              <a:rPr lang="en-US" dirty="0" err="1"/>
+              <a:t>t.isCompleted</a:t>
+            </a:r>
+            <a:r>
+              <a:rPr lang="en-US" dirty="0"/>
+              <a:t> = </a:t>
+            </a:r>
+            <a:r>
+              <a:rPr lang="en-US" dirty="0" err="1"/>
+              <a:t>cbk</a:t>
+            </a:r>
+            <a:r>
+              <a:rPr lang="en-US" dirty="0"/>
+              <a:t>;</a:t>
+            </a:r>
+          </a:p>
+          <a:p>
+            <a:pPr marL="0" indent="0">
+              <a:buNone/>
+            </a:pPr>
+            <a:r>
+              <a:rPr lang="en-US" dirty="0"/>
+              <a:t>      } else {</a:t>
+            </a:r>
+          </a:p>
+          <a:p>
+            <a:pPr marL="0" indent="0">
+              <a:buNone/>
+            </a:pPr>
+            <a:r>
+              <a:rPr lang="en-US" dirty="0"/>
+              <a:t>        alert('Oops something went wrong!');</a:t>
+            </a:r>
+          </a:p>
+          <a:p>
+            <a:pPr marL="0" indent="0">
+              <a:buNone/>
+            </a:pPr>
+            <a:r>
+              <a:rPr lang="en-US" dirty="0"/>
+              <a:t>      }</a:t>
+            </a:r>
+          </a:p>
+          <a:p>
+            <a:pPr marL="0" indent="0">
+              <a:buNone/>
+            </a:pPr>
+            <a:r>
+              <a:rPr lang="en-US" dirty="0"/>
+              <a:t>    });</a:t>
+            </a:r>
+          </a:p>
+          <a:p>
+            <a:pPr marL="0" indent="0">
+              <a:buNone/>
+            </a:pPr>
+            <a:r>
+              <a:rPr lang="en-US" dirty="0"/>
+              <a:t>  };</a:t>
+            </a:r>
+          </a:p>
+        </p:txBody>
+      </p:sp>
+    </p:spTree>
+    <p:extLst>
+      <p:ext uri="{BB962C8B-B14F-4D97-AF65-F5344CB8AC3E}">
+        <p14:creationId xmlns:p14="http://schemas.microsoft.com/office/powerpoint/2010/main" val="3311675152"/>
+      </p:ext>
+    </p:extLst>
+  </p:cSld>
+  <p:clrMapOvr>
+    <a:masterClrMapping/>
+  </p:clrMapOvr>
+</p:sld>
+</file>
+
 <file path=ppt/slides/slide4.xml><?xml version="1.0" encoding="utf-8"?>
 <p:sld xmlns:a="http://schemas.openxmlformats.org/drawingml/2006/main" xmlns:r="http://schemas.openxmlformats.org/officeDocument/2006/relationships" xmlns:p="http://schemas.openxmlformats.org/presentationml/2006/main">
   <p:cSld>
@@ -10987,9 +13334,12 @@
           <a:p>
             <a:r>
               <a:rPr lang="en-US" b="1" dirty="0" smtClean="0"/>
-              <a:t>MongoDB Stores Documents</a:t>
-            </a:r>
-            <a:endParaRPr lang="en-US" b="1" dirty="0"/>
+              <a:t>Stores </a:t>
+            </a:r>
+            <a:r>
+              <a:rPr lang="en-US" b="1" dirty="0"/>
+              <a:t>BSON Documents</a:t>
+            </a:r>
           </a:p>
         </p:txBody>
       </p:sp>
@@ -11231,10 +13581,9 @@
           <a:lstStyle/>
           <a:p>
             <a:r>
-              <a:rPr lang="en-US" b="1" dirty="0" smtClean="0"/>
-              <a:t>MongoDB Stores Documents</a:t>
-            </a:r>
-            <a:endParaRPr lang="en-US" b="1" dirty="0"/>
+              <a:rPr lang="en-US" b="1" dirty="0"/>
+              <a:t>Stores BSON Documents</a:t>
+            </a:r>
           </a:p>
         </p:txBody>
       </p:sp>
@@ -11476,10 +13825,9 @@
           <a:lstStyle/>
           <a:p>
             <a:r>
-              <a:rPr lang="en-US" b="1" dirty="0" smtClean="0"/>
-              <a:t>MongoDB Stores Documents</a:t>
-            </a:r>
-            <a:endParaRPr lang="en-US" b="1" dirty="0"/>
+              <a:rPr lang="en-US" b="1" dirty="0"/>
+              <a:t>Stores BSON Documents</a:t>
+            </a:r>
           </a:p>
         </p:txBody>
       </p:sp>
@@ -11946,7 +14294,7 @@
           <a:p>
             <a:r>
               <a:rPr lang="en-US" b="1" dirty="0" smtClean="0"/>
-              <a:t>Getting started</a:t>
+              <a:t>Getting started: install mongo</a:t>
             </a:r>
             <a:endParaRPr lang="en-US" b="1" dirty="0"/>
           </a:p>
@@ -12017,11 +14365,7 @@
                 <a:ea typeface="Arial Unicode MS" panose="020B0604020202020204" pitchFamily="34" charset="-128"/>
                 <a:cs typeface="Arial Unicode MS" panose="020B0604020202020204" pitchFamily="34" charset="-128"/>
               </a:rPr>
-              <a:t>d</a:t>
-            </a:r>
-            <a:r>
-              <a:rPr lang="en-US" b="1" dirty="0" err="1" smtClean="0"/>
-              <a:t>b</a:t>
+              <a:t>db</a:t>
             </a:r>
             <a:endParaRPr lang="en-US" b="1" dirty="0" smtClean="0"/>
           </a:p>
@@ -12055,7 +14399,7 @@
             <a:pPr lvl="1"/>
             <a:r>
               <a:rPr lang="en-US" dirty="0" smtClean="0"/>
-              <a:t>Start the server :</a:t>
+              <a:t>Start the server:</a:t>
             </a:r>
           </a:p>
           <a:p>
@@ -12084,7 +14428,15 @@
             <a:pPr lvl="1"/>
             <a:r>
               <a:rPr lang="en-US" dirty="0" smtClean="0"/>
-              <a:t>Start the command shell:</a:t>
+              <a:t>Start the command shell (from </a:t>
+            </a:r>
+            <a:r>
+              <a:rPr lang="en-US" dirty="0" err="1" smtClean="0"/>
+              <a:t>Intellij</a:t>
+            </a:r>
+            <a:r>
+              <a:rPr lang="en-US" dirty="0" smtClean="0"/>
+              <a:t> Terminal helps):</a:t>
             </a:r>
           </a:p>
           <a:p>

</xml_diff>